<commit_message>
Finished initial version of poster
</commit_message>
<xml_diff>
--- a/Documents/Poster.pptx
+++ b/Documents/Poster.pptx
@@ -104,6 +104,11 @@
       </a:defRPr>
     </a:lvl9pPr>
   </p:defaultTextStyle>
+  <p:extLst>
+    <p:ext uri="{EFAFB233-063F-42B5-8137-9DF3F51BA10A}">
+      <p15:sldGuideLst xmlns:p15="http://schemas.microsoft.com/office/powerpoint/2012/main"/>
+    </p:ext>
+  </p:extLst>
 </p:presentation>
 </file>
 
@@ -2950,6 +2955,25 @@
 <file path=ppt/slides/slide1.xml><?xml version="1.0" encoding="utf-8"?>
 <p:sld xmlns:a="http://schemas.openxmlformats.org/drawingml/2006/main" xmlns:r="http://schemas.openxmlformats.org/officeDocument/2006/relationships" xmlns:p="http://schemas.openxmlformats.org/presentationml/2006/main">
   <p:cSld>
+    <p:bg>
+      <p:bgPr>
+        <a:gradFill>
+          <a:gsLst>
+            <a:gs pos="100000">
+              <a:schemeClr val="accent2"/>
+            </a:gs>
+            <a:gs pos="81000">
+              <a:srgbClr val="F4B184"/>
+            </a:gs>
+            <a:gs pos="0">
+              <a:schemeClr val="bg1"/>
+            </a:gs>
+          </a:gsLst>
+          <a:lin ang="5400000" scaled="1"/>
+        </a:gradFill>
+        <a:effectLst/>
+      </p:bgPr>
+    </p:bg>
     <p:spTree>
       <p:nvGrpSpPr>
         <p:cNvPr id="1" name=""/>
@@ -2964,6 +2988,298 @@
           <a:chExt cx="0" cy="0"/>
         </a:xfrm>
       </p:grpSpPr>
+      <p:pic>
+        <p:nvPicPr>
+          <p:cNvPr id="2" name="Google Shape;118;p25"/>
+          <p:cNvPicPr preferRelativeResize="0"/>
+          <p:nvPr/>
+        </p:nvPicPr>
+        <p:blipFill rotWithShape="1">
+          <a:blip r:embed="rId2">
+            <a:alphaModFix/>
+          </a:blip>
+          <a:srcRect/>
+          <a:stretch/>
+        </p:blipFill>
+        <p:spPr>
+          <a:xfrm>
+            <a:off x="9915524" y="123826"/>
+            <a:ext cx="2162175" cy="776324"/>
+          </a:xfrm>
+          <a:prstGeom prst="rect">
+            <a:avLst/>
+          </a:prstGeom>
+          <a:noFill/>
+          <a:ln>
+            <a:noFill/>
+          </a:ln>
+        </p:spPr>
+      </p:pic>
+      <p:pic>
+        <p:nvPicPr>
+          <p:cNvPr id="1026" name="Picture 2" descr="Image result for lmu logo"/>
+          <p:cNvPicPr>
+            <a:picLocks noChangeAspect="1" noChangeArrowheads="1"/>
+          </p:cNvPicPr>
+          <p:nvPr/>
+        </p:nvPicPr>
+        <p:blipFill>
+          <a:blip r:embed="rId3" cstate="print">
+            <a:extLst>
+              <a:ext uri="{BEBA8EAE-BF5A-486C-A8C5-ECC9F3942E4B}">
+                <a14:imgProps xmlns:a14="http://schemas.microsoft.com/office/drawing/2010/main">
+                  <a14:imgLayer r:embed="rId4">
+                    <a14:imgEffect>
+                      <a14:backgroundRemoval t="14333" b="85000" l="14556" r="85556">
+                        <a14:foregroundMark x1="49222" y1="24778" x2="49889" y2="75444"/>
+                        <a14:foregroundMark x1="60111" y1="41444" x2="60111" y2="42333"/>
+                        <a14:foregroundMark x1="35667" y1="52111" x2="61778" y2="52667"/>
+                      </a14:backgroundRemoval>
+                    </a14:imgEffect>
+                  </a14:imgLayer>
+                </a14:imgProps>
+              </a:ext>
+              <a:ext uri="{28A0092B-C50C-407E-A947-70E740481C1C}">
+                <a14:useLocalDpi xmlns:a14="http://schemas.microsoft.com/office/drawing/2010/main" val="0"/>
+              </a:ext>
+            </a:extLst>
+          </a:blip>
+          <a:srcRect/>
+          <a:stretch>
+            <a:fillRect/>
+          </a:stretch>
+        </p:blipFill>
+        <p:spPr bwMode="auto">
+          <a:xfrm>
+            <a:off x="-142875" y="-164287"/>
+            <a:ext cx="1352550" cy="1352550"/>
+          </a:xfrm>
+          <a:prstGeom prst="rect">
+            <a:avLst/>
+          </a:prstGeom>
+          <a:noFill/>
+          <a:extLst>
+            <a:ext uri="{909E8E84-426E-40DD-AFC4-6F175D3DCCD1}">
+              <a14:hiddenFill xmlns:a14="http://schemas.microsoft.com/office/drawing/2010/main">
+                <a:solidFill>
+                  <a:srgbClr val="FFFFFF"/>
+                </a:solidFill>
+              </a14:hiddenFill>
+            </a:ext>
+          </a:extLst>
+        </p:spPr>
+      </p:pic>
+      <p:sp>
+        <p:nvSpPr>
+          <p:cNvPr id="3" name="TextBox 2"/>
+          <p:cNvSpPr txBox="1"/>
+          <p:nvPr/>
+        </p:nvSpPr>
+        <p:spPr>
+          <a:xfrm>
+            <a:off x="1362074" y="-138499"/>
+            <a:ext cx="8553450" cy="1723549"/>
+          </a:xfrm>
+          <a:prstGeom prst="rect">
+            <a:avLst/>
+          </a:prstGeom>
+          <a:noFill/>
+        </p:spPr>
+        <p:txBody>
+          <a:bodyPr wrap="square" rtlCol="0" anchor="ctr">
+            <a:spAutoFit/>
+          </a:bodyPr>
+          <a:lstStyle/>
+          <a:p>
+            <a:pPr algn="ctr"/>
+            <a:r>
+              <a:rPr lang="en-US" sz="8800" dirty="0" smtClean="0">
+                <a:latin typeface="+mj-lt"/>
+              </a:rPr>
+              <a:t>SAFEXEC</a:t>
+            </a:r>
+          </a:p>
+          <a:p>
+            <a:pPr algn="ctr"/>
+            <a:r>
+              <a:rPr lang="en-US" dirty="0" smtClean="0">
+                <a:latin typeface="+mj-lt"/>
+              </a:rPr>
+              <a:t>John Hardy</a:t>
+            </a:r>
+            <a:endParaRPr lang="en-US" dirty="0">
+              <a:latin typeface="+mj-lt"/>
+            </a:endParaRPr>
+          </a:p>
+        </p:txBody>
+      </p:sp>
+      <p:pic>
+        <p:nvPicPr>
+          <p:cNvPr id="5" name="Picture 2" descr="Image result for Python"/>
+          <p:cNvPicPr>
+            <a:picLocks noChangeAspect="1" noChangeArrowheads="1"/>
+          </p:cNvPicPr>
+          <p:nvPr/>
+        </p:nvPicPr>
+        <p:blipFill>
+          <a:blip r:embed="rId5">
+            <a:extLst>
+              <a:ext uri="{28A0092B-C50C-407E-A947-70E740481C1C}">
+                <a14:useLocalDpi xmlns:a14="http://schemas.microsoft.com/office/drawing/2010/main" val="0"/>
+              </a:ext>
+            </a:extLst>
+          </a:blip>
+          <a:srcRect/>
+          <a:stretch>
+            <a:fillRect/>
+          </a:stretch>
+        </p:blipFill>
+        <p:spPr bwMode="auto">
+          <a:xfrm>
+            <a:off x="8075024" y="1896111"/>
+            <a:ext cx="1905000" cy="1905000"/>
+          </a:xfrm>
+          <a:prstGeom prst="rect">
+            <a:avLst/>
+          </a:prstGeom>
+          <a:noFill/>
+          <a:extLst>
+            <a:ext uri="{909E8E84-426E-40DD-AFC4-6F175D3DCCD1}">
+              <a14:hiddenFill xmlns:a14="http://schemas.microsoft.com/office/drawing/2010/main">
+                <a:solidFill>
+                  <a:srgbClr val="FFFFFF"/>
+                </a:solidFill>
+              </a14:hiddenFill>
+            </a:ext>
+          </a:extLst>
+        </p:spPr>
+      </p:pic>
+      <p:pic>
+        <p:nvPicPr>
+          <p:cNvPr id="6" name="Picture 6" descr="Image result for SHA512"/>
+          <p:cNvPicPr>
+            <a:picLocks noChangeAspect="1" noChangeArrowheads="1"/>
+          </p:cNvPicPr>
+          <p:nvPr/>
+        </p:nvPicPr>
+        <p:blipFill>
+          <a:blip r:embed="rId6">
+            <a:extLst>
+              <a:ext uri="{28A0092B-C50C-407E-A947-70E740481C1C}">
+                <a14:useLocalDpi xmlns:a14="http://schemas.microsoft.com/office/drawing/2010/main" val="0"/>
+              </a:ext>
+            </a:extLst>
+          </a:blip>
+          <a:srcRect/>
+          <a:stretch>
+            <a:fillRect/>
+          </a:stretch>
+        </p:blipFill>
+        <p:spPr bwMode="auto">
+          <a:xfrm>
+            <a:off x="9446579" y="3959862"/>
+            <a:ext cx="1909232" cy="1909232"/>
+          </a:xfrm>
+          <a:prstGeom prst="rect">
+            <a:avLst/>
+          </a:prstGeom>
+          <a:noFill/>
+          <a:extLst>
+            <a:ext uri="{909E8E84-426E-40DD-AFC4-6F175D3DCCD1}">
+              <a14:hiddenFill xmlns:a14="http://schemas.microsoft.com/office/drawing/2010/main">
+                <a:solidFill>
+                  <a:srgbClr val="FFFFFF"/>
+                </a:solidFill>
+              </a14:hiddenFill>
+            </a:ext>
+          </a:extLst>
+        </p:spPr>
+      </p:pic>
+      <p:pic>
+        <p:nvPicPr>
+          <p:cNvPr id="7" name="Picture 2" descr="Image result for hxd"/>
+          <p:cNvPicPr>
+            <a:picLocks noChangeAspect="1" noChangeArrowheads="1"/>
+          </p:cNvPicPr>
+          <p:nvPr/>
+        </p:nvPicPr>
+        <p:blipFill>
+          <a:blip r:embed="rId7">
+            <a:extLst>
+              <a:ext uri="{28A0092B-C50C-407E-A947-70E740481C1C}">
+                <a14:useLocalDpi xmlns:a14="http://schemas.microsoft.com/office/drawing/2010/main" val="0"/>
+              </a:ext>
+            </a:extLst>
+          </a:blip>
+          <a:srcRect/>
+          <a:stretch>
+            <a:fillRect/>
+          </a:stretch>
+        </p:blipFill>
+        <p:spPr bwMode="auto">
+          <a:xfrm>
+            <a:off x="6693597" y="4060011"/>
+            <a:ext cx="2170005" cy="2170006"/>
+          </a:xfrm>
+          <a:prstGeom prst="rect">
+            <a:avLst/>
+          </a:prstGeom>
+          <a:noFill/>
+          <a:extLst>
+            <a:ext uri="{909E8E84-426E-40DD-AFC4-6F175D3DCCD1}">
+              <a14:hiddenFill xmlns:a14="http://schemas.microsoft.com/office/drawing/2010/main">
+                <a:solidFill>
+                  <a:srgbClr val="FFFFFF"/>
+                </a:solidFill>
+              </a14:hiddenFill>
+            </a:ext>
+          </a:extLst>
+        </p:spPr>
+      </p:pic>
+      <p:pic>
+        <p:nvPicPr>
+          <p:cNvPr id="8" name="Picture 7"/>
+          <p:cNvPicPr>
+            <a:picLocks noChangeAspect="1"/>
+          </p:cNvPicPr>
+          <p:nvPr/>
+        </p:nvPicPr>
+        <p:blipFill>
+          <a:blip r:embed="rId8">
+            <a:extLst>
+              <a:ext uri="{28A0092B-C50C-407E-A947-70E740481C1C}">
+                <a14:useLocalDpi xmlns:a14="http://schemas.microsoft.com/office/drawing/2010/main" val="0"/>
+              </a:ext>
+            </a:extLst>
+          </a:blip>
+          <a:stretch>
+            <a:fillRect/>
+          </a:stretch>
+        </p:blipFill>
+        <p:spPr>
+          <a:xfrm>
+            <a:off x="1928132" y="2947758"/>
+            <a:ext cx="3805578" cy="1458425"/>
+          </a:xfrm>
+          <a:prstGeom prst="rect">
+            <a:avLst/>
+          </a:prstGeom>
+          <a:ln w="38100" cap="sq">
+            <a:solidFill>
+              <a:srgbClr val="000000"/>
+            </a:solidFill>
+            <a:prstDash val="solid"/>
+            <a:miter lim="800000"/>
+          </a:ln>
+          <a:effectLst>
+            <a:outerShdw blurRad="50800" dist="38100" dir="2700000" algn="tl" rotWithShape="0">
+              <a:srgbClr val="000000">
+                <a:alpha val="43000"/>
+              </a:srgbClr>
+            </a:outerShdw>
+          </a:effectLst>
+        </p:spPr>
+      </p:pic>
     </p:spTree>
     <p:extLst>
       <p:ext uri="{BB962C8B-B14F-4D97-AF65-F5344CB8AC3E}">

</xml_diff>

<commit_message>
Finished preliminary version of poster.
</commit_message>
<xml_diff>
--- a/Documents/Poster.pptx
+++ b/Documents/Poster.pptx
@@ -243,7 +243,7 @@
           <a:p>
             <a:fld id="{95049C98-6431-4040-AD43-C2CCE4230543}" type="datetimeFigureOut">
               <a:rPr lang="en-US" smtClean="0"/>
-              <a:t>4/15/2019</a:t>
+              <a:t>4/16/2019</a:t>
             </a:fld>
             <a:endParaRPr lang="en-US"/>
           </a:p>
@@ -413,7 +413,7 @@
           <a:p>
             <a:fld id="{95049C98-6431-4040-AD43-C2CCE4230543}" type="datetimeFigureOut">
               <a:rPr lang="en-US" smtClean="0"/>
-              <a:t>4/15/2019</a:t>
+              <a:t>4/16/2019</a:t>
             </a:fld>
             <a:endParaRPr lang="en-US"/>
           </a:p>
@@ -593,7 +593,7 @@
           <a:p>
             <a:fld id="{95049C98-6431-4040-AD43-C2CCE4230543}" type="datetimeFigureOut">
               <a:rPr lang="en-US" smtClean="0"/>
-              <a:t>4/15/2019</a:t>
+              <a:t>4/16/2019</a:t>
             </a:fld>
             <a:endParaRPr lang="en-US"/>
           </a:p>
@@ -763,7 +763,7 @@
           <a:p>
             <a:fld id="{95049C98-6431-4040-AD43-C2CCE4230543}" type="datetimeFigureOut">
               <a:rPr lang="en-US" smtClean="0"/>
-              <a:t>4/15/2019</a:t>
+              <a:t>4/16/2019</a:t>
             </a:fld>
             <a:endParaRPr lang="en-US"/>
           </a:p>
@@ -1009,7 +1009,7 @@
           <a:p>
             <a:fld id="{95049C98-6431-4040-AD43-C2CCE4230543}" type="datetimeFigureOut">
               <a:rPr lang="en-US" smtClean="0"/>
-              <a:t>4/15/2019</a:t>
+              <a:t>4/16/2019</a:t>
             </a:fld>
             <a:endParaRPr lang="en-US"/>
           </a:p>
@@ -1241,7 +1241,7 @@
           <a:p>
             <a:fld id="{95049C98-6431-4040-AD43-C2CCE4230543}" type="datetimeFigureOut">
               <a:rPr lang="en-US" smtClean="0"/>
-              <a:t>4/15/2019</a:t>
+              <a:t>4/16/2019</a:t>
             </a:fld>
             <a:endParaRPr lang="en-US"/>
           </a:p>
@@ -1608,7 +1608,7 @@
           <a:p>
             <a:fld id="{95049C98-6431-4040-AD43-C2CCE4230543}" type="datetimeFigureOut">
               <a:rPr lang="en-US" smtClean="0"/>
-              <a:t>4/15/2019</a:t>
+              <a:t>4/16/2019</a:t>
             </a:fld>
             <a:endParaRPr lang="en-US"/>
           </a:p>
@@ -1726,7 +1726,7 @@
           <a:p>
             <a:fld id="{95049C98-6431-4040-AD43-C2CCE4230543}" type="datetimeFigureOut">
               <a:rPr lang="en-US" smtClean="0"/>
-              <a:t>4/15/2019</a:t>
+              <a:t>4/16/2019</a:t>
             </a:fld>
             <a:endParaRPr lang="en-US"/>
           </a:p>
@@ -1821,7 +1821,7 @@
           <a:p>
             <a:fld id="{95049C98-6431-4040-AD43-C2CCE4230543}" type="datetimeFigureOut">
               <a:rPr lang="en-US" smtClean="0"/>
-              <a:t>4/15/2019</a:t>
+              <a:t>4/16/2019</a:t>
             </a:fld>
             <a:endParaRPr lang="en-US"/>
           </a:p>
@@ -2098,7 +2098,7 @@
           <a:p>
             <a:fld id="{95049C98-6431-4040-AD43-C2CCE4230543}" type="datetimeFigureOut">
               <a:rPr lang="en-US" smtClean="0"/>
-              <a:t>4/15/2019</a:t>
+              <a:t>4/16/2019</a:t>
             </a:fld>
             <a:endParaRPr lang="en-US"/>
           </a:p>
@@ -2351,7 +2351,7 @@
           <a:p>
             <a:fld id="{95049C98-6431-4040-AD43-C2CCE4230543}" type="datetimeFigureOut">
               <a:rPr lang="en-US" smtClean="0"/>
-              <a:t>4/15/2019</a:t>
+              <a:t>4/16/2019</a:t>
             </a:fld>
             <a:endParaRPr lang="en-US"/>
           </a:p>
@@ -2564,7 +2564,7 @@
           <a:p>
             <a:fld id="{95049C98-6431-4040-AD43-C2CCE4230543}" type="datetimeFigureOut">
               <a:rPr lang="en-US" smtClean="0"/>
-              <a:t>4/15/2019</a:t>
+              <a:t>4/16/2019</a:t>
             </a:fld>
             <a:endParaRPr lang="en-US"/>
           </a:p>
@@ -3003,7 +3003,7 @@
         </p:blipFill>
         <p:spPr>
           <a:xfrm>
-            <a:off x="9915524" y="123826"/>
+            <a:off x="136773" y="108140"/>
             <a:ext cx="2162175" cy="776324"/>
           </a:xfrm>
           <a:prstGeom prst="rect">
@@ -3051,8 +3051,8 @@
         </p:blipFill>
         <p:spPr bwMode="auto">
           <a:xfrm>
-            <a:off x="-142875" y="-164287"/>
-            <a:ext cx="1352550" cy="1352550"/>
+            <a:off x="2554910" y="3532"/>
+            <a:ext cx="1018284" cy="1018284"/>
           </a:xfrm>
           <a:prstGeom prst="rect">
             <a:avLst/>
@@ -3077,8 +3077,8 @@
         </p:nvSpPr>
         <p:spPr>
           <a:xfrm>
-            <a:off x="1362074" y="-138499"/>
-            <a:ext cx="8553450" cy="1723549"/>
+            <a:off x="3662056" y="-52951"/>
+            <a:ext cx="4658550" cy="1569660"/>
           </a:xfrm>
           <a:prstGeom prst="rect">
             <a:avLst/>
@@ -3093,21 +3093,12 @@
           <a:p>
             <a:pPr algn="ctr"/>
             <a:r>
-              <a:rPr lang="en-US" sz="8800" dirty="0" smtClean="0">
+              <a:rPr lang="en-US" sz="9600" dirty="0" smtClean="0">
                 <a:latin typeface="+mj-lt"/>
               </a:rPr>
               <a:t>SAFEXEC</a:t>
             </a:r>
-          </a:p>
-          <a:p>
-            <a:pPr algn="ctr"/>
-            <a:r>
-              <a:rPr lang="en-US" dirty="0" smtClean="0">
-                <a:latin typeface="+mj-lt"/>
-              </a:rPr>
-              <a:t>John Hardy</a:t>
-            </a:r>
-            <a:endParaRPr lang="en-US" dirty="0">
+            <a:endParaRPr lang="en-US" sz="9600" dirty="0" smtClean="0">
               <a:latin typeface="+mj-lt"/>
             </a:endParaRPr>
           </a:p>
@@ -3136,8 +3127,8 @@
         </p:blipFill>
         <p:spPr bwMode="auto">
           <a:xfrm>
-            <a:off x="8075024" y="1896111"/>
-            <a:ext cx="1905000" cy="1905000"/>
+            <a:off x="3891187" y="5844560"/>
+            <a:ext cx="1141443" cy="1141443"/>
           </a:xfrm>
           <a:prstGeom prst="rect">
             <a:avLst/>
@@ -3163,7 +3154,7 @@
           <p:nvPr/>
         </p:nvPicPr>
         <p:blipFill>
-          <a:blip r:embed="rId6">
+          <a:blip r:embed="rId6" cstate="print">
             <a:extLst>
               <a:ext uri="{28A0092B-C50C-407E-A947-70E740481C1C}">
                 <a14:useLocalDpi xmlns:a14="http://schemas.microsoft.com/office/drawing/2010/main" val="0"/>
@@ -3177,8 +3168,8 @@
         </p:blipFill>
         <p:spPr bwMode="auto">
           <a:xfrm>
-            <a:off x="9446579" y="3959862"/>
-            <a:ext cx="1909232" cy="1909232"/>
+            <a:off x="4952189" y="6008944"/>
+            <a:ext cx="760879" cy="760879"/>
           </a:xfrm>
           <a:prstGeom prst="rect">
             <a:avLst/>
@@ -3218,8 +3209,8 @@
         </p:blipFill>
         <p:spPr bwMode="auto">
           <a:xfrm>
-            <a:off x="6693597" y="4060011"/>
-            <a:ext cx="2170005" cy="2170006"/>
+            <a:off x="5738410" y="6008913"/>
+            <a:ext cx="977090" cy="977091"/>
           </a:xfrm>
           <a:prstGeom prst="rect">
             <a:avLst/>
@@ -3258,7 +3249,7 @@
         </p:blipFill>
         <p:spPr>
           <a:xfrm>
-            <a:off x="1928132" y="2947758"/>
+            <a:off x="136773" y="5291376"/>
             <a:ext cx="3805578" cy="1458425"/>
           </a:xfrm>
           <a:prstGeom prst="rect">
@@ -3280,6 +3271,311 @@
           </a:effectLst>
         </p:spPr>
       </p:pic>
+      <p:pic>
+        <p:nvPicPr>
+          <p:cNvPr id="9" name="Google Shape;122;p25" descr="Image result for Github icon"/>
+          <p:cNvPicPr preferRelativeResize="0"/>
+          <p:nvPr/>
+        </p:nvPicPr>
+        <p:blipFill>
+          <a:blip r:embed="rId9">
+            <a:alphaModFix/>
+            <a:extLst>
+              <a:ext uri="{BEBA8EAE-BF5A-486C-A8C5-ECC9F3942E4B}">
+                <a14:imgProps xmlns:a14="http://schemas.microsoft.com/office/drawing/2010/main">
+                  <a14:imgLayer r:embed="rId10">
+                    <a14:imgEffect>
+                      <a14:backgroundRemoval t="0" b="98537" l="0" r="100000">
+                        <a14:foregroundMark x1="33333" y1="41951" x2="33333" y2="41951"/>
+                        <a14:foregroundMark x1="35366" y1="39512" x2="35366" y2="39512"/>
+                        <a14:foregroundMark x1="59756" y1="39512" x2="59756" y2="39512"/>
+                        <a14:foregroundMark x1="59756" y1="38049" x2="59756" y2="38049"/>
+                        <a14:foregroundMark x1="59756" y1="44878" x2="59756" y2="44878"/>
+                      </a14:backgroundRemoval>
+                    </a14:imgEffect>
+                  </a14:imgLayer>
+                </a14:imgProps>
+              </a:ext>
+            </a:extLst>
+          </a:blip>
+          <a:stretch>
+            <a:fillRect/>
+          </a:stretch>
+        </p:blipFill>
+        <p:spPr>
+          <a:xfrm>
+            <a:off x="6564354" y="6034841"/>
+            <a:ext cx="904379" cy="760882"/>
+          </a:xfrm>
+          <a:prstGeom prst="rect">
+            <a:avLst/>
+          </a:prstGeom>
+          <a:noFill/>
+          <a:ln>
+            <a:noFill/>
+          </a:ln>
+        </p:spPr>
+      </p:pic>
+      <p:sp>
+        <p:nvSpPr>
+          <p:cNvPr id="4" name="TextBox 3"/>
+          <p:cNvSpPr txBox="1"/>
+          <p:nvPr/>
+        </p:nvSpPr>
+        <p:spPr>
+          <a:xfrm>
+            <a:off x="136773" y="1020793"/>
+            <a:ext cx="3805578" cy="4154984"/>
+          </a:xfrm>
+          <a:prstGeom prst="rect">
+            <a:avLst/>
+          </a:prstGeom>
+          <a:noFill/>
+        </p:spPr>
+        <p:txBody>
+          <a:bodyPr wrap="square" rtlCol="0">
+            <a:spAutoFit/>
+          </a:bodyPr>
+          <a:lstStyle/>
+          <a:p>
+            <a:pPr algn="ctr"/>
+            <a:r>
+              <a:rPr lang="en-US" sz="3600" dirty="0" smtClean="0"/>
+              <a:t>What is Code Signing?</a:t>
+            </a:r>
+          </a:p>
+          <a:p>
+            <a:pPr algn="ctr"/>
+            <a:r>
+              <a:rPr lang="en-US" sz="2400" dirty="0"/>
+              <a:t>Code signing is the process of digitally signing </a:t>
+            </a:r>
+            <a:r>
+              <a:rPr lang="en-US" sz="2400" dirty="0" smtClean="0"/>
+              <a:t>a binary executable in order to </a:t>
+            </a:r>
+            <a:r>
+              <a:rPr lang="en-US" sz="2400" dirty="0"/>
+              <a:t>confirm </a:t>
+            </a:r>
+            <a:r>
+              <a:rPr lang="en-US" sz="2400" dirty="0" smtClean="0"/>
+              <a:t>that </a:t>
+            </a:r>
+            <a:r>
+              <a:rPr lang="en-US" sz="2400" dirty="0"/>
+              <a:t>the code has not been </a:t>
+            </a:r>
+            <a:r>
+              <a:rPr lang="en-US" sz="2400" dirty="0" smtClean="0"/>
+              <a:t>tampered with since </a:t>
+            </a:r>
+            <a:r>
+              <a:rPr lang="en-US" sz="2400" dirty="0"/>
+              <a:t>it was </a:t>
+            </a:r>
+            <a:r>
+              <a:rPr lang="en-US" sz="2400" dirty="0" smtClean="0"/>
+              <a:t>signed. Safexec is a code signing application for executable files on Linux.</a:t>
+            </a:r>
+            <a:endParaRPr lang="en-US" sz="2400" dirty="0"/>
+          </a:p>
+        </p:txBody>
+      </p:sp>
+      <p:sp>
+        <p:nvSpPr>
+          <p:cNvPr id="11" name="TextBox 10"/>
+          <p:cNvSpPr txBox="1"/>
+          <p:nvPr/>
+        </p:nvSpPr>
+        <p:spPr>
+          <a:xfrm>
+            <a:off x="8288163" y="847478"/>
+            <a:ext cx="3805578" cy="4154984"/>
+          </a:xfrm>
+          <a:prstGeom prst="rect">
+            <a:avLst/>
+          </a:prstGeom>
+          <a:noFill/>
+        </p:spPr>
+        <p:txBody>
+          <a:bodyPr wrap="square" rtlCol="0">
+            <a:spAutoFit/>
+          </a:bodyPr>
+          <a:lstStyle/>
+          <a:p>
+            <a:pPr algn="ctr"/>
+            <a:r>
+              <a:rPr lang="en-US" sz="3600" dirty="0" smtClean="0"/>
+              <a:t>How Does Safexec Work?</a:t>
+            </a:r>
+            <a:endParaRPr lang="en-US" sz="3600" dirty="0"/>
+          </a:p>
+          <a:p>
+            <a:pPr algn="ctr"/>
+            <a:r>
+              <a:rPr lang="en-US" sz="2400" dirty="0" smtClean="0"/>
+              <a:t>The programmer uses Safexec to sign an ELF file into an ELFS file. The ELFS is sent to the user. Safexec is run on the ELFS. Safexec informs the user if the ELFS is safe to execute. An ELF is then produced for the user.</a:t>
+            </a:r>
+            <a:endParaRPr lang="en-US" sz="2400" dirty="0"/>
+          </a:p>
+        </p:txBody>
+      </p:sp>
+      <p:pic>
+        <p:nvPicPr>
+          <p:cNvPr id="12" name="Picture 11"/>
+          <p:cNvPicPr>
+            <a:picLocks noChangeAspect="1"/>
+          </p:cNvPicPr>
+          <p:nvPr/>
+        </p:nvPicPr>
+        <p:blipFill>
+          <a:blip r:embed="rId11" cstate="print">
+            <a:extLst>
+              <a:ext uri="{28A0092B-C50C-407E-A947-70E740481C1C}">
+                <a14:useLocalDpi xmlns:a14="http://schemas.microsoft.com/office/drawing/2010/main" val="0"/>
+              </a:ext>
+            </a:extLst>
+          </a:blip>
+          <a:stretch>
+            <a:fillRect/>
+          </a:stretch>
+        </p:blipFill>
+        <p:spPr>
+          <a:xfrm>
+            <a:off x="8288163" y="5002462"/>
+            <a:ext cx="3805578" cy="1747339"/>
+          </a:xfrm>
+          <a:prstGeom prst="rect">
+            <a:avLst/>
+          </a:prstGeom>
+        </p:spPr>
+      </p:pic>
+      <p:sp>
+        <p:nvSpPr>
+          <p:cNvPr id="13" name="TextBox 12"/>
+          <p:cNvSpPr txBox="1"/>
+          <p:nvPr/>
+        </p:nvSpPr>
+        <p:spPr>
+          <a:xfrm>
+            <a:off x="8759698" y="108140"/>
+            <a:ext cx="3334043" cy="707886"/>
+          </a:xfrm>
+          <a:prstGeom prst="rect">
+            <a:avLst/>
+          </a:prstGeom>
+          <a:noFill/>
+        </p:spPr>
+        <p:txBody>
+          <a:bodyPr wrap="square" rtlCol="0">
+            <a:spAutoFit/>
+          </a:bodyPr>
+          <a:lstStyle/>
+          <a:p>
+            <a:pPr algn="r"/>
+            <a:r>
+              <a:rPr lang="en-US" sz="2000" dirty="0"/>
+              <a:t>John Hardy</a:t>
+            </a:r>
+          </a:p>
+          <a:p>
+            <a:pPr algn="r"/>
+            <a:r>
+              <a:rPr lang="en-US" sz="2000" dirty="0" smtClean="0"/>
+              <a:t>CMSI 402</a:t>
+            </a:r>
+            <a:endParaRPr lang="en-US" sz="2000" dirty="0"/>
+          </a:p>
+        </p:txBody>
+      </p:sp>
+      <p:pic>
+        <p:nvPicPr>
+          <p:cNvPr id="1028" name="Picture 4" descr="Image result for ubuntu logo"/>
+          <p:cNvPicPr>
+            <a:picLocks noChangeAspect="1" noChangeArrowheads="1"/>
+          </p:cNvPicPr>
+          <p:nvPr/>
+        </p:nvPicPr>
+        <p:blipFill>
+          <a:blip r:embed="rId12" cstate="print">
+            <a:extLst>
+              <a:ext uri="{28A0092B-C50C-407E-A947-70E740481C1C}">
+                <a14:useLocalDpi xmlns:a14="http://schemas.microsoft.com/office/drawing/2010/main" val="0"/>
+              </a:ext>
+            </a:extLst>
+          </a:blip>
+          <a:srcRect/>
+          <a:stretch>
+            <a:fillRect/>
+          </a:stretch>
+        </p:blipFill>
+        <p:spPr bwMode="auto">
+          <a:xfrm>
+            <a:off x="7443060" y="6051055"/>
+            <a:ext cx="728454" cy="728454"/>
+          </a:xfrm>
+          <a:prstGeom prst="rect">
+            <a:avLst/>
+          </a:prstGeom>
+          <a:noFill/>
+          <a:extLst>
+            <a:ext uri="{909E8E84-426E-40DD-AFC4-6F175D3DCCD1}">
+              <a14:hiddenFill xmlns:a14="http://schemas.microsoft.com/office/drawing/2010/main">
+                <a:solidFill>
+                  <a:srgbClr val="FFFFFF"/>
+                </a:solidFill>
+              </a14:hiddenFill>
+            </a:ext>
+          </a:extLst>
+        </p:spPr>
+      </p:pic>
+      <p:sp>
+        <p:nvSpPr>
+          <p:cNvPr id="16" name="TextBox 15"/>
+          <p:cNvSpPr txBox="1"/>
+          <p:nvPr/>
+        </p:nvSpPr>
+        <p:spPr>
+          <a:xfrm>
+            <a:off x="4212468" y="1392028"/>
+            <a:ext cx="3805578" cy="4708981"/>
+          </a:xfrm>
+          <a:prstGeom prst="rect">
+            <a:avLst/>
+          </a:prstGeom>
+          <a:noFill/>
+        </p:spPr>
+        <p:txBody>
+          <a:bodyPr wrap="square" rtlCol="0">
+            <a:spAutoFit/>
+          </a:bodyPr>
+          <a:lstStyle/>
+          <a:p>
+            <a:pPr algn="ctr"/>
+            <a:r>
+              <a:rPr lang="en-US" sz="3600" dirty="0" smtClean="0"/>
+              <a:t>Resources Utilized</a:t>
+            </a:r>
+          </a:p>
+          <a:p>
+            <a:pPr algn="ctr"/>
+            <a:r>
+              <a:rPr lang="en-US" sz="2400" dirty="0" smtClean="0"/>
+              <a:t>All of the source code for Safexec was written in Python. The </a:t>
+            </a:r>
+            <a:r>
+              <a:rPr lang="en-US" sz="2400" i="1" dirty="0" smtClean="0"/>
+              <a:t>Hashlib</a:t>
+            </a:r>
+            <a:r>
+              <a:rPr lang="en-US" sz="2400" dirty="0" smtClean="0"/>
+              <a:t> library was used for the SHA 512 hashing. HxD was used to manipulate executables in hexadecimal format. GitHub was used for version control. Ubuntu was used for generating ELF files for modification.</a:t>
+            </a:r>
+            <a:endParaRPr lang="en-US" sz="2400" dirty="0"/>
+          </a:p>
+        </p:txBody>
+      </p:sp>
     </p:spTree>
     <p:extLst>
       <p:ext uri="{BB962C8B-B14F-4D97-AF65-F5344CB8AC3E}">

</xml_diff>

<commit_message>
Updated poster to correct size, generated PDF version.
</commit_message>
<xml_diff>
--- a/Documents/Poster.pptx
+++ b/Documents/Poster.pptx
@@ -2,19 +2,19 @@
 <file path=ppt/presentation.xml><?xml version="1.0" encoding="utf-8"?>
 <p:presentation xmlns:a="http://schemas.openxmlformats.org/drawingml/2006/main" xmlns:r="http://schemas.openxmlformats.org/officeDocument/2006/relationships" xmlns:p="http://schemas.openxmlformats.org/presentationml/2006/main" saveSubsetFonts="1">
   <p:sldMasterIdLst>
-    <p:sldMasterId id="2147483648" r:id="rId1"/>
+    <p:sldMasterId id="2147483660" r:id="rId1"/>
   </p:sldMasterIdLst>
   <p:sldIdLst>
     <p:sldId id="256" r:id="rId2"/>
   </p:sldIdLst>
-  <p:sldSz cx="12192000" cy="6858000"/>
+  <p:sldSz cx="43891200" cy="32918400"/>
   <p:notesSz cx="6858000" cy="9144000"/>
   <p:defaultTextStyle>
     <a:defPPr>
       <a:defRPr lang="en-US"/>
     </a:defPPr>
-    <a:lvl1pPr marL="0" algn="l" defTabSz="914400" rtl="0" eaLnBrk="1" latinLnBrk="0" hangingPunct="1">
-      <a:defRPr sz="1800" kern="1200">
+    <a:lvl1pPr marL="0" algn="l" defTabSz="3686861" rtl="0" eaLnBrk="1" latinLnBrk="0" hangingPunct="1">
+      <a:defRPr sz="7258" kern="1200">
         <a:solidFill>
           <a:schemeClr val="tx1"/>
         </a:solidFill>
@@ -23,8 +23,8 @@
         <a:cs typeface="+mn-cs"/>
       </a:defRPr>
     </a:lvl1pPr>
-    <a:lvl2pPr marL="457200" algn="l" defTabSz="914400" rtl="0" eaLnBrk="1" latinLnBrk="0" hangingPunct="1">
-      <a:defRPr sz="1800" kern="1200">
+    <a:lvl2pPr marL="1843430" algn="l" defTabSz="3686861" rtl="0" eaLnBrk="1" latinLnBrk="0" hangingPunct="1">
+      <a:defRPr sz="7258" kern="1200">
         <a:solidFill>
           <a:schemeClr val="tx1"/>
         </a:solidFill>
@@ -33,8 +33,8 @@
         <a:cs typeface="+mn-cs"/>
       </a:defRPr>
     </a:lvl2pPr>
-    <a:lvl3pPr marL="914400" algn="l" defTabSz="914400" rtl="0" eaLnBrk="1" latinLnBrk="0" hangingPunct="1">
-      <a:defRPr sz="1800" kern="1200">
+    <a:lvl3pPr marL="3686861" algn="l" defTabSz="3686861" rtl="0" eaLnBrk="1" latinLnBrk="0" hangingPunct="1">
+      <a:defRPr sz="7258" kern="1200">
         <a:solidFill>
           <a:schemeClr val="tx1"/>
         </a:solidFill>
@@ -43,8 +43,8 @@
         <a:cs typeface="+mn-cs"/>
       </a:defRPr>
     </a:lvl3pPr>
-    <a:lvl4pPr marL="1371600" algn="l" defTabSz="914400" rtl="0" eaLnBrk="1" latinLnBrk="0" hangingPunct="1">
-      <a:defRPr sz="1800" kern="1200">
+    <a:lvl4pPr marL="5530291" algn="l" defTabSz="3686861" rtl="0" eaLnBrk="1" latinLnBrk="0" hangingPunct="1">
+      <a:defRPr sz="7258" kern="1200">
         <a:solidFill>
           <a:schemeClr val="tx1"/>
         </a:solidFill>
@@ -53,8 +53,8 @@
         <a:cs typeface="+mn-cs"/>
       </a:defRPr>
     </a:lvl4pPr>
-    <a:lvl5pPr marL="1828800" algn="l" defTabSz="914400" rtl="0" eaLnBrk="1" latinLnBrk="0" hangingPunct="1">
-      <a:defRPr sz="1800" kern="1200">
+    <a:lvl5pPr marL="7373722" algn="l" defTabSz="3686861" rtl="0" eaLnBrk="1" latinLnBrk="0" hangingPunct="1">
+      <a:defRPr sz="7258" kern="1200">
         <a:solidFill>
           <a:schemeClr val="tx1"/>
         </a:solidFill>
@@ -63,8 +63,8 @@
         <a:cs typeface="+mn-cs"/>
       </a:defRPr>
     </a:lvl5pPr>
-    <a:lvl6pPr marL="2286000" algn="l" defTabSz="914400" rtl="0" eaLnBrk="1" latinLnBrk="0" hangingPunct="1">
-      <a:defRPr sz="1800" kern="1200">
+    <a:lvl6pPr marL="9217152" algn="l" defTabSz="3686861" rtl="0" eaLnBrk="1" latinLnBrk="0" hangingPunct="1">
+      <a:defRPr sz="7258" kern="1200">
         <a:solidFill>
           <a:schemeClr val="tx1"/>
         </a:solidFill>
@@ -73,8 +73,8 @@
         <a:cs typeface="+mn-cs"/>
       </a:defRPr>
     </a:lvl6pPr>
-    <a:lvl7pPr marL="2743200" algn="l" defTabSz="914400" rtl="0" eaLnBrk="1" latinLnBrk="0" hangingPunct="1">
-      <a:defRPr sz="1800" kern="1200">
+    <a:lvl7pPr marL="11060582" algn="l" defTabSz="3686861" rtl="0" eaLnBrk="1" latinLnBrk="0" hangingPunct="1">
+      <a:defRPr sz="7258" kern="1200">
         <a:solidFill>
           <a:schemeClr val="tx1"/>
         </a:solidFill>
@@ -83,8 +83,8 @@
         <a:cs typeface="+mn-cs"/>
       </a:defRPr>
     </a:lvl7pPr>
-    <a:lvl8pPr marL="3200400" algn="l" defTabSz="914400" rtl="0" eaLnBrk="1" latinLnBrk="0" hangingPunct="1">
-      <a:defRPr sz="1800" kern="1200">
+    <a:lvl8pPr marL="12904013" algn="l" defTabSz="3686861" rtl="0" eaLnBrk="1" latinLnBrk="0" hangingPunct="1">
+      <a:defRPr sz="7258" kern="1200">
         <a:solidFill>
           <a:schemeClr val="tx1"/>
         </a:solidFill>
@@ -93,8 +93,8 @@
         <a:cs typeface="+mn-cs"/>
       </a:defRPr>
     </a:lvl8pPr>
-    <a:lvl9pPr marL="3657600" algn="l" defTabSz="914400" rtl="0" eaLnBrk="1" latinLnBrk="0" hangingPunct="1">
-      <a:defRPr sz="1800" kern="1200">
+    <a:lvl9pPr marL="14747443" algn="l" defTabSz="3686861" rtl="0" eaLnBrk="1" latinLnBrk="0" hangingPunct="1">
+      <a:defRPr sz="7258" kern="1200">
         <a:solidFill>
           <a:schemeClr val="tx1"/>
         </a:solidFill>
@@ -141,15 +141,15 @@
         </p:nvSpPr>
         <p:spPr>
           <a:xfrm>
-            <a:off x="1524000" y="1122363"/>
-            <a:ext cx="9144000" cy="2387600"/>
+            <a:off x="3291840" y="5387342"/>
+            <a:ext cx="37307520" cy="11460480"/>
           </a:xfrm>
         </p:spPr>
         <p:txBody>
           <a:bodyPr anchor="b"/>
           <a:lstStyle>
             <a:lvl1pPr algn="ctr">
-              <a:defRPr sz="6000"/>
+              <a:defRPr sz="28800"/>
             </a:lvl1pPr>
           </a:lstStyle>
           <a:p>
@@ -157,7 +157,7 @@
               <a:rPr lang="en-US" smtClean="0"/>
               <a:t>Click to edit Master title style</a:t>
             </a:r>
-            <a:endParaRPr lang="en-US"/>
+            <a:endParaRPr lang="en-US" dirty="0"/>
           </a:p>
         </p:txBody>
       </p:sp>
@@ -173,8 +173,8 @@
         </p:nvSpPr>
         <p:spPr>
           <a:xfrm>
-            <a:off x="1524000" y="3602038"/>
-            <a:ext cx="9144000" cy="1655762"/>
+            <a:off x="5486400" y="17289782"/>
+            <a:ext cx="32918400" cy="7947658"/>
           </a:xfrm>
         </p:spPr>
         <p:txBody>
@@ -182,39 +182,39 @@
           <a:lstStyle>
             <a:lvl1pPr marL="0" indent="0" algn="ctr">
               <a:buNone/>
-              <a:defRPr sz="2400"/>
+              <a:defRPr sz="11520"/>
             </a:lvl1pPr>
-            <a:lvl2pPr marL="457200" indent="0" algn="ctr">
-              <a:buNone/>
-              <a:defRPr sz="2000"/>
+            <a:lvl2pPr marL="2194560" indent="0" algn="ctr">
+              <a:buNone/>
+              <a:defRPr sz="9600"/>
             </a:lvl2pPr>
-            <a:lvl3pPr marL="914400" indent="0" algn="ctr">
-              <a:buNone/>
-              <a:defRPr sz="1800"/>
+            <a:lvl3pPr marL="4389120" indent="0" algn="ctr">
+              <a:buNone/>
+              <a:defRPr sz="8640"/>
             </a:lvl3pPr>
-            <a:lvl4pPr marL="1371600" indent="0" algn="ctr">
-              <a:buNone/>
-              <a:defRPr sz="1600"/>
+            <a:lvl4pPr marL="6583680" indent="0" algn="ctr">
+              <a:buNone/>
+              <a:defRPr sz="7680"/>
             </a:lvl4pPr>
-            <a:lvl5pPr marL="1828800" indent="0" algn="ctr">
-              <a:buNone/>
-              <a:defRPr sz="1600"/>
+            <a:lvl5pPr marL="8778240" indent="0" algn="ctr">
+              <a:buNone/>
+              <a:defRPr sz="7680"/>
             </a:lvl5pPr>
-            <a:lvl6pPr marL="2286000" indent="0" algn="ctr">
-              <a:buNone/>
-              <a:defRPr sz="1600"/>
+            <a:lvl6pPr marL="10972800" indent="0" algn="ctr">
+              <a:buNone/>
+              <a:defRPr sz="7680"/>
             </a:lvl6pPr>
-            <a:lvl7pPr marL="2743200" indent="0" algn="ctr">
-              <a:buNone/>
-              <a:defRPr sz="1600"/>
+            <a:lvl7pPr marL="13167360" indent="0" algn="ctr">
+              <a:buNone/>
+              <a:defRPr sz="7680"/>
             </a:lvl7pPr>
-            <a:lvl8pPr marL="3200400" indent="0" algn="ctr">
-              <a:buNone/>
-              <a:defRPr sz="1600"/>
+            <a:lvl8pPr marL="15361920" indent="0" algn="ctr">
+              <a:buNone/>
+              <a:defRPr sz="7680"/>
             </a:lvl8pPr>
-            <a:lvl9pPr marL="3657600" indent="0" algn="ctr">
-              <a:buNone/>
-              <a:defRPr sz="1600"/>
+            <a:lvl9pPr marL="17556480" indent="0" algn="ctr">
+              <a:buNone/>
+              <a:defRPr sz="7680"/>
             </a:lvl9pPr>
           </a:lstStyle>
           <a:p>
@@ -222,7 +222,7 @@
               <a:rPr lang="en-US" smtClean="0"/>
               <a:t>Click to edit Master subtitle style</a:t>
             </a:r>
-            <a:endParaRPr lang="en-US"/>
+            <a:endParaRPr lang="en-US" dirty="0"/>
           </a:p>
         </p:txBody>
       </p:sp>
@@ -243,7 +243,7 @@
           <a:p>
             <a:fld id="{95049C98-6431-4040-AD43-C2CCE4230543}" type="datetimeFigureOut">
               <a:rPr lang="en-US" smtClean="0"/>
-              <a:t>4/16/2019</a:t>
+              <a:t>4/28/2019</a:t>
             </a:fld>
             <a:endParaRPr lang="en-US"/>
           </a:p>
@@ -294,7 +294,7 @@
     </p:spTree>
     <p:extLst>
       <p:ext uri="{BB962C8B-B14F-4D97-AF65-F5344CB8AC3E}">
-        <p14:creationId xmlns:p14="http://schemas.microsoft.com/office/powerpoint/2010/main" val="1689932817"/>
+        <p14:creationId xmlns:p14="http://schemas.microsoft.com/office/powerpoint/2010/main" val="2885157378"/>
       </p:ext>
     </p:extLst>
   </p:cSld>
@@ -340,7 +340,7 @@
               <a:rPr lang="en-US" smtClean="0"/>
               <a:t>Click to edit Master title style</a:t>
             </a:r>
-            <a:endParaRPr lang="en-US"/>
+            <a:endParaRPr lang="en-US" dirty="0"/>
           </a:p>
         </p:txBody>
       </p:sp>
@@ -392,7 +392,7 @@
               <a:rPr lang="en-US" smtClean="0"/>
               <a:t>Fifth level</a:t>
             </a:r>
-            <a:endParaRPr lang="en-US"/>
+            <a:endParaRPr lang="en-US" dirty="0"/>
           </a:p>
         </p:txBody>
       </p:sp>
@@ -413,7 +413,7 @@
           <a:p>
             <a:fld id="{95049C98-6431-4040-AD43-C2CCE4230543}" type="datetimeFigureOut">
               <a:rPr lang="en-US" smtClean="0"/>
-              <a:t>4/16/2019</a:t>
+              <a:t>4/28/2019</a:t>
             </a:fld>
             <a:endParaRPr lang="en-US"/>
           </a:p>
@@ -464,7 +464,7 @@
     </p:spTree>
     <p:extLst>
       <p:ext uri="{BB962C8B-B14F-4D97-AF65-F5344CB8AC3E}">
-        <p14:creationId xmlns:p14="http://schemas.microsoft.com/office/powerpoint/2010/main" val="1080034041"/>
+        <p14:creationId xmlns:p14="http://schemas.microsoft.com/office/powerpoint/2010/main" val="2127748397"/>
       </p:ext>
     </p:extLst>
   </p:cSld>
@@ -503,8 +503,8 @@
         </p:nvSpPr>
         <p:spPr>
           <a:xfrm>
-            <a:off x="8724900" y="365125"/>
-            <a:ext cx="2628900" cy="5811838"/>
+            <a:off x="31409642" y="1752600"/>
+            <a:ext cx="9464040" cy="27896822"/>
           </a:xfrm>
         </p:spPr>
         <p:txBody>
@@ -515,7 +515,7 @@
               <a:rPr lang="en-US" smtClean="0"/>
               <a:t>Click to edit Master title style</a:t>
             </a:r>
-            <a:endParaRPr lang="en-US"/>
+            <a:endParaRPr lang="en-US" dirty="0"/>
           </a:p>
         </p:txBody>
       </p:sp>
@@ -531,8 +531,8 @@
         </p:nvSpPr>
         <p:spPr>
           <a:xfrm>
-            <a:off x="838200" y="365125"/>
-            <a:ext cx="7734300" cy="5811838"/>
+            <a:off x="3017522" y="1752600"/>
+            <a:ext cx="27843480" cy="27896822"/>
           </a:xfrm>
         </p:spPr>
         <p:txBody>
@@ -572,7 +572,7 @@
               <a:rPr lang="en-US" smtClean="0"/>
               <a:t>Fifth level</a:t>
             </a:r>
-            <a:endParaRPr lang="en-US"/>
+            <a:endParaRPr lang="en-US" dirty="0"/>
           </a:p>
         </p:txBody>
       </p:sp>
@@ -593,7 +593,7 @@
           <a:p>
             <a:fld id="{95049C98-6431-4040-AD43-C2CCE4230543}" type="datetimeFigureOut">
               <a:rPr lang="en-US" smtClean="0"/>
-              <a:t>4/16/2019</a:t>
+              <a:t>4/28/2019</a:t>
             </a:fld>
             <a:endParaRPr lang="en-US"/>
           </a:p>
@@ -644,7 +644,7 @@
     </p:spTree>
     <p:extLst>
       <p:ext uri="{BB962C8B-B14F-4D97-AF65-F5344CB8AC3E}">
-        <p14:creationId xmlns:p14="http://schemas.microsoft.com/office/powerpoint/2010/main" val="3757170291"/>
+        <p14:creationId xmlns:p14="http://schemas.microsoft.com/office/powerpoint/2010/main" val="3205279639"/>
       </p:ext>
     </p:extLst>
   </p:cSld>
@@ -690,7 +690,7 @@
               <a:rPr lang="en-US" smtClean="0"/>
               <a:t>Click to edit Master title style</a:t>
             </a:r>
-            <a:endParaRPr lang="en-US"/>
+            <a:endParaRPr lang="en-US" dirty="0"/>
           </a:p>
         </p:txBody>
       </p:sp>
@@ -742,7 +742,7 @@
               <a:rPr lang="en-US" smtClean="0"/>
               <a:t>Fifth level</a:t>
             </a:r>
-            <a:endParaRPr lang="en-US"/>
+            <a:endParaRPr lang="en-US" dirty="0"/>
           </a:p>
         </p:txBody>
       </p:sp>
@@ -763,7 +763,7 @@
           <a:p>
             <a:fld id="{95049C98-6431-4040-AD43-C2CCE4230543}" type="datetimeFigureOut">
               <a:rPr lang="en-US" smtClean="0"/>
-              <a:t>4/16/2019</a:t>
+              <a:t>4/28/2019</a:t>
             </a:fld>
             <a:endParaRPr lang="en-US"/>
           </a:p>
@@ -814,7 +814,7 @@
     </p:spTree>
     <p:extLst>
       <p:ext uri="{BB962C8B-B14F-4D97-AF65-F5344CB8AC3E}">
-        <p14:creationId xmlns:p14="http://schemas.microsoft.com/office/powerpoint/2010/main" val="2308632336"/>
+        <p14:creationId xmlns:p14="http://schemas.microsoft.com/office/powerpoint/2010/main" val="2975019975"/>
       </p:ext>
     </p:extLst>
   </p:cSld>
@@ -853,15 +853,15 @@
         </p:nvSpPr>
         <p:spPr>
           <a:xfrm>
-            <a:off x="831850" y="1709738"/>
-            <a:ext cx="10515600" cy="2852737"/>
+            <a:off x="2994662" y="8206749"/>
+            <a:ext cx="37856160" cy="13693138"/>
           </a:xfrm>
         </p:spPr>
         <p:txBody>
           <a:bodyPr anchor="b"/>
           <a:lstStyle>
             <a:lvl1pPr>
-              <a:defRPr sz="6000"/>
+              <a:defRPr sz="28800"/>
             </a:lvl1pPr>
           </a:lstStyle>
           <a:p>
@@ -869,7 +869,7 @@
               <a:rPr lang="en-US" smtClean="0"/>
               <a:t>Click to edit Master title style</a:t>
             </a:r>
-            <a:endParaRPr lang="en-US"/>
+            <a:endParaRPr lang="en-US" dirty="0"/>
           </a:p>
         </p:txBody>
       </p:sp>
@@ -885,8 +885,8 @@
         </p:nvSpPr>
         <p:spPr>
           <a:xfrm>
-            <a:off x="831850" y="4589463"/>
-            <a:ext cx="10515600" cy="1500187"/>
+            <a:off x="2994662" y="22029429"/>
+            <a:ext cx="37856160" cy="7200898"/>
           </a:xfrm>
         </p:spPr>
         <p:txBody>
@@ -894,17 +894,15 @@
           <a:lstStyle>
             <a:lvl1pPr marL="0" indent="0">
               <a:buNone/>
-              <a:defRPr sz="2400">
+              <a:defRPr sz="11520">
                 <a:solidFill>
-                  <a:schemeClr val="tx1">
-                    <a:tint val="75000"/>
-                  </a:schemeClr>
+                  <a:schemeClr val="tx1"/>
                 </a:solidFill>
               </a:defRPr>
             </a:lvl1pPr>
-            <a:lvl2pPr marL="457200" indent="0">
-              <a:buNone/>
-              <a:defRPr sz="2000">
+            <a:lvl2pPr marL="2194560" indent="0">
+              <a:buNone/>
+              <a:defRPr sz="9600">
                 <a:solidFill>
                   <a:schemeClr val="tx1">
                     <a:tint val="75000"/>
@@ -912,9 +910,9 @@
                 </a:solidFill>
               </a:defRPr>
             </a:lvl2pPr>
-            <a:lvl3pPr marL="914400" indent="0">
-              <a:buNone/>
-              <a:defRPr sz="1800">
+            <a:lvl3pPr marL="4389120" indent="0">
+              <a:buNone/>
+              <a:defRPr sz="8640">
                 <a:solidFill>
                   <a:schemeClr val="tx1">
                     <a:tint val="75000"/>
@@ -922,9 +920,9 @@
                 </a:solidFill>
               </a:defRPr>
             </a:lvl3pPr>
-            <a:lvl4pPr marL="1371600" indent="0">
-              <a:buNone/>
-              <a:defRPr sz="1600">
+            <a:lvl4pPr marL="6583680" indent="0">
+              <a:buNone/>
+              <a:defRPr sz="7680">
                 <a:solidFill>
                   <a:schemeClr val="tx1">
                     <a:tint val="75000"/>
@@ -932,9 +930,9 @@
                 </a:solidFill>
               </a:defRPr>
             </a:lvl4pPr>
-            <a:lvl5pPr marL="1828800" indent="0">
-              <a:buNone/>
-              <a:defRPr sz="1600">
+            <a:lvl5pPr marL="8778240" indent="0">
+              <a:buNone/>
+              <a:defRPr sz="7680">
                 <a:solidFill>
                   <a:schemeClr val="tx1">
                     <a:tint val="75000"/>
@@ -942,9 +940,9 @@
                 </a:solidFill>
               </a:defRPr>
             </a:lvl5pPr>
-            <a:lvl6pPr marL="2286000" indent="0">
-              <a:buNone/>
-              <a:defRPr sz="1600">
+            <a:lvl6pPr marL="10972800" indent="0">
+              <a:buNone/>
+              <a:defRPr sz="7680">
                 <a:solidFill>
                   <a:schemeClr val="tx1">
                     <a:tint val="75000"/>
@@ -952,9 +950,9 @@
                 </a:solidFill>
               </a:defRPr>
             </a:lvl6pPr>
-            <a:lvl7pPr marL="2743200" indent="0">
-              <a:buNone/>
-              <a:defRPr sz="1600">
+            <a:lvl7pPr marL="13167360" indent="0">
+              <a:buNone/>
+              <a:defRPr sz="7680">
                 <a:solidFill>
                   <a:schemeClr val="tx1">
                     <a:tint val="75000"/>
@@ -962,9 +960,9 @@
                 </a:solidFill>
               </a:defRPr>
             </a:lvl7pPr>
-            <a:lvl8pPr marL="3200400" indent="0">
-              <a:buNone/>
-              <a:defRPr sz="1600">
+            <a:lvl8pPr marL="15361920" indent="0">
+              <a:buNone/>
+              <a:defRPr sz="7680">
                 <a:solidFill>
                   <a:schemeClr val="tx1">
                     <a:tint val="75000"/>
@@ -972,9 +970,9 @@
                 </a:solidFill>
               </a:defRPr>
             </a:lvl8pPr>
-            <a:lvl9pPr marL="3657600" indent="0">
-              <a:buNone/>
-              <a:defRPr sz="1600">
+            <a:lvl9pPr marL="17556480" indent="0">
+              <a:buNone/>
+              <a:defRPr sz="7680">
                 <a:solidFill>
                   <a:schemeClr val="tx1">
                     <a:tint val="75000"/>
@@ -1009,7 +1007,7 @@
           <a:p>
             <a:fld id="{95049C98-6431-4040-AD43-C2CCE4230543}" type="datetimeFigureOut">
               <a:rPr lang="en-US" smtClean="0"/>
-              <a:t>4/16/2019</a:t>
+              <a:t>4/28/2019</a:t>
             </a:fld>
             <a:endParaRPr lang="en-US"/>
           </a:p>
@@ -1060,7 +1058,7 @@
     </p:spTree>
     <p:extLst>
       <p:ext uri="{BB962C8B-B14F-4D97-AF65-F5344CB8AC3E}">
-        <p14:creationId xmlns:p14="http://schemas.microsoft.com/office/powerpoint/2010/main" val="3523524310"/>
+        <p14:creationId xmlns:p14="http://schemas.microsoft.com/office/powerpoint/2010/main" val="1224165700"/>
       </p:ext>
     </p:extLst>
   </p:cSld>
@@ -1106,7 +1104,7 @@
               <a:rPr lang="en-US" smtClean="0"/>
               <a:t>Click to edit Master title style</a:t>
             </a:r>
-            <a:endParaRPr lang="en-US"/>
+            <a:endParaRPr lang="en-US" dirty="0"/>
           </a:p>
         </p:txBody>
       </p:sp>
@@ -1122,8 +1120,8 @@
         </p:nvSpPr>
         <p:spPr>
           <a:xfrm>
-            <a:off x="838200" y="1825625"/>
-            <a:ext cx="5181600" cy="4351338"/>
+            <a:off x="3017520" y="8763000"/>
+            <a:ext cx="18653760" cy="20886422"/>
           </a:xfrm>
         </p:spPr>
         <p:txBody>
@@ -1163,7 +1161,7 @@
               <a:rPr lang="en-US" smtClean="0"/>
               <a:t>Fifth level</a:t>
             </a:r>
-            <a:endParaRPr lang="en-US"/>
+            <a:endParaRPr lang="en-US" dirty="0"/>
           </a:p>
         </p:txBody>
       </p:sp>
@@ -1179,8 +1177,8 @@
         </p:nvSpPr>
         <p:spPr>
           <a:xfrm>
-            <a:off x="6172200" y="1825625"/>
-            <a:ext cx="5181600" cy="4351338"/>
+            <a:off x="22219920" y="8763000"/>
+            <a:ext cx="18653760" cy="20886422"/>
           </a:xfrm>
         </p:spPr>
         <p:txBody>
@@ -1220,7 +1218,7 @@
               <a:rPr lang="en-US" smtClean="0"/>
               <a:t>Fifth level</a:t>
             </a:r>
-            <a:endParaRPr lang="en-US"/>
+            <a:endParaRPr lang="en-US" dirty="0"/>
           </a:p>
         </p:txBody>
       </p:sp>
@@ -1241,7 +1239,7 @@
           <a:p>
             <a:fld id="{95049C98-6431-4040-AD43-C2CCE4230543}" type="datetimeFigureOut">
               <a:rPr lang="en-US" smtClean="0"/>
-              <a:t>4/16/2019</a:t>
+              <a:t>4/28/2019</a:t>
             </a:fld>
             <a:endParaRPr lang="en-US"/>
           </a:p>
@@ -1292,7 +1290,7 @@
     </p:spTree>
     <p:extLst>
       <p:ext uri="{BB962C8B-B14F-4D97-AF65-F5344CB8AC3E}">
-        <p14:creationId xmlns:p14="http://schemas.microsoft.com/office/powerpoint/2010/main" val="862817944"/>
+        <p14:creationId xmlns:p14="http://schemas.microsoft.com/office/powerpoint/2010/main" val="76240104"/>
       </p:ext>
     </p:extLst>
   </p:cSld>
@@ -1331,8 +1329,8 @@
         </p:nvSpPr>
         <p:spPr>
           <a:xfrm>
-            <a:off x="839788" y="365125"/>
-            <a:ext cx="10515600" cy="1325563"/>
+            <a:off x="3023237" y="1752607"/>
+            <a:ext cx="37856160" cy="6362702"/>
           </a:xfrm>
         </p:spPr>
         <p:txBody>
@@ -1343,7 +1341,7 @@
               <a:rPr lang="en-US" smtClean="0"/>
               <a:t>Click to edit Master title style</a:t>
             </a:r>
-            <a:endParaRPr lang="en-US"/>
+            <a:endParaRPr lang="en-US" dirty="0"/>
           </a:p>
         </p:txBody>
       </p:sp>
@@ -1359,8 +1357,8 @@
         </p:nvSpPr>
         <p:spPr>
           <a:xfrm>
-            <a:off x="839788" y="1681163"/>
-            <a:ext cx="5157787" cy="823912"/>
+            <a:off x="3023242" y="8069582"/>
+            <a:ext cx="18568032" cy="3954778"/>
           </a:xfrm>
         </p:spPr>
         <p:txBody>
@@ -1368,39 +1366,39 @@
           <a:lstStyle>
             <a:lvl1pPr marL="0" indent="0">
               <a:buNone/>
-              <a:defRPr sz="2400" b="1"/>
+              <a:defRPr sz="11520" b="1"/>
             </a:lvl1pPr>
-            <a:lvl2pPr marL="457200" indent="0">
-              <a:buNone/>
-              <a:defRPr sz="2000" b="1"/>
+            <a:lvl2pPr marL="2194560" indent="0">
+              <a:buNone/>
+              <a:defRPr sz="9600" b="1"/>
             </a:lvl2pPr>
-            <a:lvl3pPr marL="914400" indent="0">
-              <a:buNone/>
-              <a:defRPr sz="1800" b="1"/>
+            <a:lvl3pPr marL="4389120" indent="0">
+              <a:buNone/>
+              <a:defRPr sz="8640" b="1"/>
             </a:lvl3pPr>
-            <a:lvl4pPr marL="1371600" indent="0">
-              <a:buNone/>
-              <a:defRPr sz="1600" b="1"/>
+            <a:lvl4pPr marL="6583680" indent="0">
+              <a:buNone/>
+              <a:defRPr sz="7680" b="1"/>
             </a:lvl4pPr>
-            <a:lvl5pPr marL="1828800" indent="0">
-              <a:buNone/>
-              <a:defRPr sz="1600" b="1"/>
+            <a:lvl5pPr marL="8778240" indent="0">
+              <a:buNone/>
+              <a:defRPr sz="7680" b="1"/>
             </a:lvl5pPr>
-            <a:lvl6pPr marL="2286000" indent="0">
-              <a:buNone/>
-              <a:defRPr sz="1600" b="1"/>
+            <a:lvl6pPr marL="10972800" indent="0">
+              <a:buNone/>
+              <a:defRPr sz="7680" b="1"/>
             </a:lvl6pPr>
-            <a:lvl7pPr marL="2743200" indent="0">
-              <a:buNone/>
-              <a:defRPr sz="1600" b="1"/>
+            <a:lvl7pPr marL="13167360" indent="0">
+              <a:buNone/>
+              <a:defRPr sz="7680" b="1"/>
             </a:lvl7pPr>
-            <a:lvl8pPr marL="3200400" indent="0">
-              <a:buNone/>
-              <a:defRPr sz="1600" b="1"/>
+            <a:lvl8pPr marL="15361920" indent="0">
+              <a:buNone/>
+              <a:defRPr sz="7680" b="1"/>
             </a:lvl8pPr>
-            <a:lvl9pPr marL="3657600" indent="0">
-              <a:buNone/>
-              <a:defRPr sz="1600" b="1"/>
+            <a:lvl9pPr marL="17556480" indent="0">
+              <a:buNone/>
+              <a:defRPr sz="7680" b="1"/>
             </a:lvl9pPr>
           </a:lstStyle>
           <a:p>
@@ -1424,8 +1422,8 @@
         </p:nvSpPr>
         <p:spPr>
           <a:xfrm>
-            <a:off x="839788" y="2505075"/>
-            <a:ext cx="5157787" cy="3684588"/>
+            <a:off x="3023242" y="12024360"/>
+            <a:ext cx="18568032" cy="17686022"/>
           </a:xfrm>
         </p:spPr>
         <p:txBody>
@@ -1465,7 +1463,7 @@
               <a:rPr lang="en-US" smtClean="0"/>
               <a:t>Fifth level</a:t>
             </a:r>
-            <a:endParaRPr lang="en-US"/>
+            <a:endParaRPr lang="en-US" dirty="0"/>
           </a:p>
         </p:txBody>
       </p:sp>
@@ -1481,8 +1479,8 @@
         </p:nvSpPr>
         <p:spPr>
           <a:xfrm>
-            <a:off x="6172200" y="1681163"/>
-            <a:ext cx="5183188" cy="823912"/>
+            <a:off x="22219922" y="8069582"/>
+            <a:ext cx="18659477" cy="3954778"/>
           </a:xfrm>
         </p:spPr>
         <p:txBody>
@@ -1490,39 +1488,39 @@
           <a:lstStyle>
             <a:lvl1pPr marL="0" indent="0">
               <a:buNone/>
-              <a:defRPr sz="2400" b="1"/>
+              <a:defRPr sz="11520" b="1"/>
             </a:lvl1pPr>
-            <a:lvl2pPr marL="457200" indent="0">
-              <a:buNone/>
-              <a:defRPr sz="2000" b="1"/>
+            <a:lvl2pPr marL="2194560" indent="0">
+              <a:buNone/>
+              <a:defRPr sz="9600" b="1"/>
             </a:lvl2pPr>
-            <a:lvl3pPr marL="914400" indent="0">
-              <a:buNone/>
-              <a:defRPr sz="1800" b="1"/>
+            <a:lvl3pPr marL="4389120" indent="0">
+              <a:buNone/>
+              <a:defRPr sz="8640" b="1"/>
             </a:lvl3pPr>
-            <a:lvl4pPr marL="1371600" indent="0">
-              <a:buNone/>
-              <a:defRPr sz="1600" b="1"/>
+            <a:lvl4pPr marL="6583680" indent="0">
+              <a:buNone/>
+              <a:defRPr sz="7680" b="1"/>
             </a:lvl4pPr>
-            <a:lvl5pPr marL="1828800" indent="0">
-              <a:buNone/>
-              <a:defRPr sz="1600" b="1"/>
+            <a:lvl5pPr marL="8778240" indent="0">
+              <a:buNone/>
+              <a:defRPr sz="7680" b="1"/>
             </a:lvl5pPr>
-            <a:lvl6pPr marL="2286000" indent="0">
-              <a:buNone/>
-              <a:defRPr sz="1600" b="1"/>
+            <a:lvl6pPr marL="10972800" indent="0">
+              <a:buNone/>
+              <a:defRPr sz="7680" b="1"/>
             </a:lvl6pPr>
-            <a:lvl7pPr marL="2743200" indent="0">
-              <a:buNone/>
-              <a:defRPr sz="1600" b="1"/>
+            <a:lvl7pPr marL="13167360" indent="0">
+              <a:buNone/>
+              <a:defRPr sz="7680" b="1"/>
             </a:lvl7pPr>
-            <a:lvl8pPr marL="3200400" indent="0">
-              <a:buNone/>
-              <a:defRPr sz="1600" b="1"/>
+            <a:lvl8pPr marL="15361920" indent="0">
+              <a:buNone/>
+              <a:defRPr sz="7680" b="1"/>
             </a:lvl8pPr>
-            <a:lvl9pPr marL="3657600" indent="0">
-              <a:buNone/>
-              <a:defRPr sz="1600" b="1"/>
+            <a:lvl9pPr marL="17556480" indent="0">
+              <a:buNone/>
+              <a:defRPr sz="7680" b="1"/>
             </a:lvl9pPr>
           </a:lstStyle>
           <a:p>
@@ -1546,8 +1544,8 @@
         </p:nvSpPr>
         <p:spPr>
           <a:xfrm>
-            <a:off x="6172200" y="2505075"/>
-            <a:ext cx="5183188" cy="3684588"/>
+            <a:off x="22219922" y="12024360"/>
+            <a:ext cx="18659477" cy="17686022"/>
           </a:xfrm>
         </p:spPr>
         <p:txBody>
@@ -1587,7 +1585,7 @@
               <a:rPr lang="en-US" smtClean="0"/>
               <a:t>Fifth level</a:t>
             </a:r>
-            <a:endParaRPr lang="en-US"/>
+            <a:endParaRPr lang="en-US" dirty="0"/>
           </a:p>
         </p:txBody>
       </p:sp>
@@ -1608,7 +1606,7 @@
           <a:p>
             <a:fld id="{95049C98-6431-4040-AD43-C2CCE4230543}" type="datetimeFigureOut">
               <a:rPr lang="en-US" smtClean="0"/>
-              <a:t>4/16/2019</a:t>
+              <a:t>4/28/2019</a:t>
             </a:fld>
             <a:endParaRPr lang="en-US"/>
           </a:p>
@@ -1659,7 +1657,7 @@
     </p:spTree>
     <p:extLst>
       <p:ext uri="{BB962C8B-B14F-4D97-AF65-F5344CB8AC3E}">
-        <p14:creationId xmlns:p14="http://schemas.microsoft.com/office/powerpoint/2010/main" val="324394034"/>
+        <p14:creationId xmlns:p14="http://schemas.microsoft.com/office/powerpoint/2010/main" val="2792522156"/>
       </p:ext>
     </p:extLst>
   </p:cSld>
@@ -1705,7 +1703,7 @@
               <a:rPr lang="en-US" smtClean="0"/>
               <a:t>Click to edit Master title style</a:t>
             </a:r>
-            <a:endParaRPr lang="en-US"/>
+            <a:endParaRPr lang="en-US" dirty="0"/>
           </a:p>
         </p:txBody>
       </p:sp>
@@ -1726,7 +1724,7 @@
           <a:p>
             <a:fld id="{95049C98-6431-4040-AD43-C2CCE4230543}" type="datetimeFigureOut">
               <a:rPr lang="en-US" smtClean="0"/>
-              <a:t>4/16/2019</a:t>
+              <a:t>4/28/2019</a:t>
             </a:fld>
             <a:endParaRPr lang="en-US"/>
           </a:p>
@@ -1777,7 +1775,7 @@
     </p:spTree>
     <p:extLst>
       <p:ext uri="{BB962C8B-B14F-4D97-AF65-F5344CB8AC3E}">
-        <p14:creationId xmlns:p14="http://schemas.microsoft.com/office/powerpoint/2010/main" val="3973884114"/>
+        <p14:creationId xmlns:p14="http://schemas.microsoft.com/office/powerpoint/2010/main" val="3259308186"/>
       </p:ext>
     </p:extLst>
   </p:cSld>
@@ -1821,7 +1819,7 @@
           <a:p>
             <a:fld id="{95049C98-6431-4040-AD43-C2CCE4230543}" type="datetimeFigureOut">
               <a:rPr lang="en-US" smtClean="0"/>
-              <a:t>4/16/2019</a:t>
+              <a:t>4/28/2019</a:t>
             </a:fld>
             <a:endParaRPr lang="en-US"/>
           </a:p>
@@ -1872,7 +1870,7 @@
     </p:spTree>
     <p:extLst>
       <p:ext uri="{BB962C8B-B14F-4D97-AF65-F5344CB8AC3E}">
-        <p14:creationId xmlns:p14="http://schemas.microsoft.com/office/powerpoint/2010/main" val="2367858361"/>
+        <p14:creationId xmlns:p14="http://schemas.microsoft.com/office/powerpoint/2010/main" val="3553080231"/>
       </p:ext>
     </p:extLst>
   </p:cSld>
@@ -1911,15 +1909,15 @@
         </p:nvSpPr>
         <p:spPr>
           <a:xfrm>
-            <a:off x="839788" y="457200"/>
-            <a:ext cx="3932237" cy="1600200"/>
+            <a:off x="3023237" y="2194560"/>
+            <a:ext cx="14156054" cy="7680960"/>
           </a:xfrm>
         </p:spPr>
         <p:txBody>
           <a:bodyPr anchor="b"/>
           <a:lstStyle>
             <a:lvl1pPr>
-              <a:defRPr sz="3200"/>
+              <a:defRPr sz="15360"/>
             </a:lvl1pPr>
           </a:lstStyle>
           <a:p>
@@ -1927,7 +1925,7 @@
               <a:rPr lang="en-US" smtClean="0"/>
               <a:t>Click to edit Master title style</a:t>
             </a:r>
-            <a:endParaRPr lang="en-US"/>
+            <a:endParaRPr lang="en-US" dirty="0"/>
           </a:p>
         </p:txBody>
       </p:sp>
@@ -1943,39 +1941,39 @@
         </p:nvSpPr>
         <p:spPr>
           <a:xfrm>
-            <a:off x="5183188" y="987425"/>
-            <a:ext cx="6172200" cy="4873625"/>
+            <a:off x="18659477" y="4739647"/>
+            <a:ext cx="22219920" cy="23393400"/>
           </a:xfrm>
         </p:spPr>
         <p:txBody>
           <a:bodyPr/>
           <a:lstStyle>
             <a:lvl1pPr>
-              <a:defRPr sz="3200"/>
+              <a:defRPr sz="15360"/>
             </a:lvl1pPr>
             <a:lvl2pPr>
-              <a:defRPr sz="2800"/>
+              <a:defRPr sz="13440"/>
             </a:lvl2pPr>
             <a:lvl3pPr>
-              <a:defRPr sz="2400"/>
+              <a:defRPr sz="11520"/>
             </a:lvl3pPr>
             <a:lvl4pPr>
-              <a:defRPr sz="2000"/>
+              <a:defRPr sz="9600"/>
             </a:lvl4pPr>
             <a:lvl5pPr>
-              <a:defRPr sz="2000"/>
+              <a:defRPr sz="9600"/>
             </a:lvl5pPr>
             <a:lvl6pPr>
-              <a:defRPr sz="2000"/>
+              <a:defRPr sz="9600"/>
             </a:lvl6pPr>
             <a:lvl7pPr>
-              <a:defRPr sz="2000"/>
+              <a:defRPr sz="9600"/>
             </a:lvl7pPr>
             <a:lvl8pPr>
-              <a:defRPr sz="2000"/>
+              <a:defRPr sz="9600"/>
             </a:lvl8pPr>
             <a:lvl9pPr>
-              <a:defRPr sz="2000"/>
+              <a:defRPr sz="9600"/>
             </a:lvl9pPr>
           </a:lstStyle>
           <a:p>
@@ -2012,7 +2010,7 @@
               <a:rPr lang="en-US" smtClean="0"/>
               <a:t>Fifth level</a:t>
             </a:r>
-            <a:endParaRPr lang="en-US"/>
+            <a:endParaRPr lang="en-US" dirty="0"/>
           </a:p>
         </p:txBody>
       </p:sp>
@@ -2028,8 +2026,8 @@
         </p:nvSpPr>
         <p:spPr>
           <a:xfrm>
-            <a:off x="839788" y="2057400"/>
-            <a:ext cx="3932237" cy="3811588"/>
+            <a:off x="3023237" y="9875520"/>
+            <a:ext cx="14156054" cy="18295622"/>
           </a:xfrm>
         </p:spPr>
         <p:txBody>
@@ -2037,39 +2035,39 @@
           <a:lstStyle>
             <a:lvl1pPr marL="0" indent="0">
               <a:buNone/>
-              <a:defRPr sz="1600"/>
+              <a:defRPr sz="7680"/>
             </a:lvl1pPr>
-            <a:lvl2pPr marL="457200" indent="0">
-              <a:buNone/>
-              <a:defRPr sz="1400"/>
+            <a:lvl2pPr marL="2194560" indent="0">
+              <a:buNone/>
+              <a:defRPr sz="6720"/>
             </a:lvl2pPr>
-            <a:lvl3pPr marL="914400" indent="0">
-              <a:buNone/>
-              <a:defRPr sz="1200"/>
+            <a:lvl3pPr marL="4389120" indent="0">
+              <a:buNone/>
+              <a:defRPr sz="5760"/>
             </a:lvl3pPr>
-            <a:lvl4pPr marL="1371600" indent="0">
-              <a:buNone/>
-              <a:defRPr sz="1000"/>
+            <a:lvl4pPr marL="6583680" indent="0">
+              <a:buNone/>
+              <a:defRPr sz="4800"/>
             </a:lvl4pPr>
-            <a:lvl5pPr marL="1828800" indent="0">
-              <a:buNone/>
-              <a:defRPr sz="1000"/>
+            <a:lvl5pPr marL="8778240" indent="0">
+              <a:buNone/>
+              <a:defRPr sz="4800"/>
             </a:lvl5pPr>
-            <a:lvl6pPr marL="2286000" indent="0">
-              <a:buNone/>
-              <a:defRPr sz="1000"/>
+            <a:lvl6pPr marL="10972800" indent="0">
+              <a:buNone/>
+              <a:defRPr sz="4800"/>
             </a:lvl6pPr>
-            <a:lvl7pPr marL="2743200" indent="0">
-              <a:buNone/>
-              <a:defRPr sz="1000"/>
+            <a:lvl7pPr marL="13167360" indent="0">
+              <a:buNone/>
+              <a:defRPr sz="4800"/>
             </a:lvl7pPr>
-            <a:lvl8pPr marL="3200400" indent="0">
-              <a:buNone/>
-              <a:defRPr sz="1000"/>
+            <a:lvl8pPr marL="15361920" indent="0">
+              <a:buNone/>
+              <a:defRPr sz="4800"/>
             </a:lvl8pPr>
-            <a:lvl9pPr marL="3657600" indent="0">
-              <a:buNone/>
-              <a:defRPr sz="1000"/>
+            <a:lvl9pPr marL="17556480" indent="0">
+              <a:buNone/>
+              <a:defRPr sz="4800"/>
             </a:lvl9pPr>
           </a:lstStyle>
           <a:p>
@@ -2098,7 +2096,7 @@
           <a:p>
             <a:fld id="{95049C98-6431-4040-AD43-C2CCE4230543}" type="datetimeFigureOut">
               <a:rPr lang="en-US" smtClean="0"/>
-              <a:t>4/16/2019</a:t>
+              <a:t>4/28/2019</a:t>
             </a:fld>
             <a:endParaRPr lang="en-US"/>
           </a:p>
@@ -2149,7 +2147,7 @@
     </p:spTree>
     <p:extLst>
       <p:ext uri="{BB962C8B-B14F-4D97-AF65-F5344CB8AC3E}">
-        <p14:creationId xmlns:p14="http://schemas.microsoft.com/office/powerpoint/2010/main" val="1067455415"/>
+        <p14:creationId xmlns:p14="http://schemas.microsoft.com/office/powerpoint/2010/main" val="1150680070"/>
       </p:ext>
     </p:extLst>
   </p:cSld>
@@ -2188,15 +2186,15 @@
         </p:nvSpPr>
         <p:spPr>
           <a:xfrm>
-            <a:off x="839788" y="457200"/>
-            <a:ext cx="3932237" cy="1600200"/>
+            <a:off x="3023237" y="2194560"/>
+            <a:ext cx="14156054" cy="7680960"/>
           </a:xfrm>
         </p:spPr>
         <p:txBody>
           <a:bodyPr anchor="b"/>
           <a:lstStyle>
             <a:lvl1pPr>
-              <a:defRPr sz="3200"/>
+              <a:defRPr sz="15360"/>
             </a:lvl1pPr>
           </a:lstStyle>
           <a:p>
@@ -2204,7 +2202,7 @@
               <a:rPr lang="en-US" smtClean="0"/>
               <a:t>Click to edit Master title style</a:t>
             </a:r>
-            <a:endParaRPr lang="en-US"/>
+            <a:endParaRPr lang="en-US" dirty="0"/>
           </a:p>
         </p:txBody>
       </p:sp>
@@ -2212,7 +2210,7 @@
         <p:nvSpPr>
           <p:cNvPr id="3" name="Picture Placeholder 2"/>
           <p:cNvSpPr>
-            <a:spLocks noGrp="1"/>
+            <a:spLocks noGrp="1" noChangeAspect="1"/>
           </p:cNvSpPr>
           <p:nvPr>
             <p:ph type="pic" idx="1"/>
@@ -2220,52 +2218,56 @@
         </p:nvSpPr>
         <p:spPr>
           <a:xfrm>
-            <a:off x="5183188" y="987425"/>
-            <a:ext cx="6172200" cy="4873625"/>
+            <a:off x="18659477" y="4739647"/>
+            <a:ext cx="22219920" cy="23393400"/>
           </a:xfrm>
         </p:spPr>
         <p:txBody>
-          <a:bodyPr/>
+          <a:bodyPr anchor="t"/>
           <a:lstStyle>
             <a:lvl1pPr marL="0" indent="0">
               <a:buNone/>
-              <a:defRPr sz="3200"/>
+              <a:defRPr sz="15360"/>
             </a:lvl1pPr>
-            <a:lvl2pPr marL="457200" indent="0">
-              <a:buNone/>
-              <a:defRPr sz="2800"/>
+            <a:lvl2pPr marL="2194560" indent="0">
+              <a:buNone/>
+              <a:defRPr sz="13440"/>
             </a:lvl2pPr>
-            <a:lvl3pPr marL="914400" indent="0">
-              <a:buNone/>
-              <a:defRPr sz="2400"/>
+            <a:lvl3pPr marL="4389120" indent="0">
+              <a:buNone/>
+              <a:defRPr sz="11520"/>
             </a:lvl3pPr>
-            <a:lvl4pPr marL="1371600" indent="0">
-              <a:buNone/>
-              <a:defRPr sz="2000"/>
+            <a:lvl4pPr marL="6583680" indent="0">
+              <a:buNone/>
+              <a:defRPr sz="9600"/>
             </a:lvl4pPr>
-            <a:lvl5pPr marL="1828800" indent="0">
-              <a:buNone/>
-              <a:defRPr sz="2000"/>
+            <a:lvl5pPr marL="8778240" indent="0">
+              <a:buNone/>
+              <a:defRPr sz="9600"/>
             </a:lvl5pPr>
-            <a:lvl6pPr marL="2286000" indent="0">
-              <a:buNone/>
-              <a:defRPr sz="2000"/>
+            <a:lvl6pPr marL="10972800" indent="0">
+              <a:buNone/>
+              <a:defRPr sz="9600"/>
             </a:lvl6pPr>
-            <a:lvl7pPr marL="2743200" indent="0">
-              <a:buNone/>
-              <a:defRPr sz="2000"/>
+            <a:lvl7pPr marL="13167360" indent="0">
+              <a:buNone/>
+              <a:defRPr sz="9600"/>
             </a:lvl7pPr>
-            <a:lvl8pPr marL="3200400" indent="0">
-              <a:buNone/>
-              <a:defRPr sz="2000"/>
+            <a:lvl8pPr marL="15361920" indent="0">
+              <a:buNone/>
+              <a:defRPr sz="9600"/>
             </a:lvl8pPr>
-            <a:lvl9pPr marL="3657600" indent="0">
-              <a:buNone/>
-              <a:defRPr sz="2000"/>
+            <a:lvl9pPr marL="17556480" indent="0">
+              <a:buNone/>
+              <a:defRPr sz="9600"/>
             </a:lvl9pPr>
           </a:lstStyle>
           <a:p>
-            <a:endParaRPr lang="en-US"/>
+            <a:r>
+              <a:rPr lang="en-US" smtClean="0"/>
+              <a:t>Click icon to add picture</a:t>
+            </a:r>
+            <a:endParaRPr lang="en-US" dirty="0"/>
           </a:p>
         </p:txBody>
       </p:sp>
@@ -2281,8 +2283,8 @@
         </p:nvSpPr>
         <p:spPr>
           <a:xfrm>
-            <a:off x="839788" y="2057400"/>
-            <a:ext cx="3932237" cy="3811588"/>
+            <a:off x="3023237" y="9875520"/>
+            <a:ext cx="14156054" cy="18295622"/>
           </a:xfrm>
         </p:spPr>
         <p:txBody>
@@ -2290,39 +2292,39 @@
           <a:lstStyle>
             <a:lvl1pPr marL="0" indent="0">
               <a:buNone/>
-              <a:defRPr sz="1600"/>
+              <a:defRPr sz="7680"/>
             </a:lvl1pPr>
-            <a:lvl2pPr marL="457200" indent="0">
-              <a:buNone/>
-              <a:defRPr sz="1400"/>
+            <a:lvl2pPr marL="2194560" indent="0">
+              <a:buNone/>
+              <a:defRPr sz="6720"/>
             </a:lvl2pPr>
-            <a:lvl3pPr marL="914400" indent="0">
-              <a:buNone/>
-              <a:defRPr sz="1200"/>
+            <a:lvl3pPr marL="4389120" indent="0">
+              <a:buNone/>
+              <a:defRPr sz="5760"/>
             </a:lvl3pPr>
-            <a:lvl4pPr marL="1371600" indent="0">
-              <a:buNone/>
-              <a:defRPr sz="1000"/>
+            <a:lvl4pPr marL="6583680" indent="0">
+              <a:buNone/>
+              <a:defRPr sz="4800"/>
             </a:lvl4pPr>
-            <a:lvl5pPr marL="1828800" indent="0">
-              <a:buNone/>
-              <a:defRPr sz="1000"/>
+            <a:lvl5pPr marL="8778240" indent="0">
+              <a:buNone/>
+              <a:defRPr sz="4800"/>
             </a:lvl5pPr>
-            <a:lvl6pPr marL="2286000" indent="0">
-              <a:buNone/>
-              <a:defRPr sz="1000"/>
+            <a:lvl6pPr marL="10972800" indent="0">
+              <a:buNone/>
+              <a:defRPr sz="4800"/>
             </a:lvl6pPr>
-            <a:lvl7pPr marL="2743200" indent="0">
-              <a:buNone/>
-              <a:defRPr sz="1000"/>
+            <a:lvl7pPr marL="13167360" indent="0">
+              <a:buNone/>
+              <a:defRPr sz="4800"/>
             </a:lvl7pPr>
-            <a:lvl8pPr marL="3200400" indent="0">
-              <a:buNone/>
-              <a:defRPr sz="1000"/>
+            <a:lvl8pPr marL="15361920" indent="0">
+              <a:buNone/>
+              <a:defRPr sz="4800"/>
             </a:lvl8pPr>
-            <a:lvl9pPr marL="3657600" indent="0">
-              <a:buNone/>
-              <a:defRPr sz="1000"/>
+            <a:lvl9pPr marL="17556480" indent="0">
+              <a:buNone/>
+              <a:defRPr sz="4800"/>
             </a:lvl9pPr>
           </a:lstStyle>
           <a:p>
@@ -2351,7 +2353,7 @@
           <a:p>
             <a:fld id="{95049C98-6431-4040-AD43-C2CCE4230543}" type="datetimeFigureOut">
               <a:rPr lang="en-US" smtClean="0"/>
-              <a:t>4/16/2019</a:t>
+              <a:t>4/28/2019</a:t>
             </a:fld>
             <a:endParaRPr lang="en-US"/>
           </a:p>
@@ -2402,7 +2404,7 @@
     </p:spTree>
     <p:extLst>
       <p:ext uri="{BB962C8B-B14F-4D97-AF65-F5344CB8AC3E}">
-        <p14:creationId xmlns:p14="http://schemas.microsoft.com/office/powerpoint/2010/main" val="256349154"/>
+        <p14:creationId xmlns:p14="http://schemas.microsoft.com/office/powerpoint/2010/main" val="848522719"/>
       </p:ext>
     </p:extLst>
   </p:cSld>
@@ -2446,8 +2448,8 @@
         </p:nvSpPr>
         <p:spPr>
           <a:xfrm>
-            <a:off x="838200" y="365125"/>
-            <a:ext cx="10515600" cy="1325563"/>
+            <a:off x="3017520" y="1752607"/>
+            <a:ext cx="37856160" cy="6362702"/>
           </a:xfrm>
           <a:prstGeom prst="rect">
             <a:avLst/>
@@ -2463,7 +2465,7 @@
               <a:rPr lang="en-US" smtClean="0"/>
               <a:t>Click to edit Master title style</a:t>
             </a:r>
-            <a:endParaRPr lang="en-US"/>
+            <a:endParaRPr lang="en-US" dirty="0"/>
           </a:p>
         </p:txBody>
       </p:sp>
@@ -2479,8 +2481,8 @@
         </p:nvSpPr>
         <p:spPr>
           <a:xfrm>
-            <a:off x="838200" y="1825625"/>
-            <a:ext cx="10515600" cy="4351338"/>
+            <a:off x="3017520" y="8763000"/>
+            <a:ext cx="37856160" cy="20886422"/>
           </a:xfrm>
           <a:prstGeom prst="rect">
             <a:avLst/>
@@ -2525,7 +2527,7 @@
               <a:rPr lang="en-US" smtClean="0"/>
               <a:t>Fifth level</a:t>
             </a:r>
-            <a:endParaRPr lang="en-US"/>
+            <a:endParaRPr lang="en-US" dirty="0"/>
           </a:p>
         </p:txBody>
       </p:sp>
@@ -2541,8 +2543,8 @@
         </p:nvSpPr>
         <p:spPr>
           <a:xfrm>
-            <a:off x="838200" y="6356350"/>
-            <a:ext cx="2743200" cy="365125"/>
+            <a:off x="3017520" y="30510487"/>
+            <a:ext cx="9875520" cy="1752600"/>
           </a:xfrm>
           <a:prstGeom prst="rect">
             <a:avLst/>
@@ -2552,7 +2554,7 @@
           <a:bodyPr vert="horz" lIns="91440" tIns="45720" rIns="91440" bIns="45720" rtlCol="0" anchor="ctr"/>
           <a:lstStyle>
             <a:lvl1pPr algn="l">
-              <a:defRPr sz="1200">
+              <a:defRPr sz="5760">
                 <a:solidFill>
                   <a:schemeClr val="tx1">
                     <a:tint val="75000"/>
@@ -2564,7 +2566,7 @@
           <a:p>
             <a:fld id="{95049C98-6431-4040-AD43-C2CCE4230543}" type="datetimeFigureOut">
               <a:rPr lang="en-US" smtClean="0"/>
-              <a:t>4/16/2019</a:t>
+              <a:t>4/28/2019</a:t>
             </a:fld>
             <a:endParaRPr lang="en-US"/>
           </a:p>
@@ -2582,8 +2584,8 @@
         </p:nvSpPr>
         <p:spPr>
           <a:xfrm>
-            <a:off x="4038600" y="6356350"/>
-            <a:ext cx="4114800" cy="365125"/>
+            <a:off x="14538960" y="30510487"/>
+            <a:ext cx="14813280" cy="1752600"/>
           </a:xfrm>
           <a:prstGeom prst="rect">
             <a:avLst/>
@@ -2593,7 +2595,7 @@
           <a:bodyPr vert="horz" lIns="91440" tIns="45720" rIns="91440" bIns="45720" rtlCol="0" anchor="ctr"/>
           <a:lstStyle>
             <a:lvl1pPr algn="ctr">
-              <a:defRPr sz="1200">
+              <a:defRPr sz="5760">
                 <a:solidFill>
                   <a:schemeClr val="tx1">
                     <a:tint val="75000"/>
@@ -2619,8 +2621,8 @@
         </p:nvSpPr>
         <p:spPr>
           <a:xfrm>
-            <a:off x="8610600" y="6356350"/>
-            <a:ext cx="2743200" cy="365125"/>
+            <a:off x="30998160" y="30510487"/>
+            <a:ext cx="9875520" cy="1752600"/>
           </a:xfrm>
           <a:prstGeom prst="rect">
             <a:avLst/>
@@ -2630,7 +2632,7 @@
           <a:bodyPr vert="horz" lIns="91440" tIns="45720" rIns="91440" bIns="45720" rtlCol="0" anchor="ctr"/>
           <a:lstStyle>
             <a:lvl1pPr algn="r">
-              <a:defRPr sz="1200">
+              <a:defRPr sz="5760">
                 <a:solidFill>
                   <a:schemeClr val="tx1">
                     <a:tint val="75000"/>
@@ -2651,27 +2653,27 @@
     </p:spTree>
     <p:extLst>
       <p:ext uri="{BB962C8B-B14F-4D97-AF65-F5344CB8AC3E}">
-        <p14:creationId xmlns:p14="http://schemas.microsoft.com/office/powerpoint/2010/main" val="2810307113"/>
+        <p14:creationId xmlns:p14="http://schemas.microsoft.com/office/powerpoint/2010/main" val="2765527781"/>
       </p:ext>
     </p:extLst>
   </p:cSld>
   <p:clrMap bg1="lt1" tx1="dk1" bg2="lt2" tx2="dk2" accent1="accent1" accent2="accent2" accent3="accent3" accent4="accent4" accent5="accent5" accent6="accent6" hlink="hlink" folHlink="folHlink"/>
   <p:sldLayoutIdLst>
-    <p:sldLayoutId id="2147483649" r:id="rId1"/>
-    <p:sldLayoutId id="2147483650" r:id="rId2"/>
-    <p:sldLayoutId id="2147483651" r:id="rId3"/>
-    <p:sldLayoutId id="2147483652" r:id="rId4"/>
-    <p:sldLayoutId id="2147483653" r:id="rId5"/>
-    <p:sldLayoutId id="2147483654" r:id="rId6"/>
-    <p:sldLayoutId id="2147483655" r:id="rId7"/>
-    <p:sldLayoutId id="2147483656" r:id="rId8"/>
-    <p:sldLayoutId id="2147483657" r:id="rId9"/>
-    <p:sldLayoutId id="2147483658" r:id="rId10"/>
-    <p:sldLayoutId id="2147483659" r:id="rId11"/>
+    <p:sldLayoutId id="2147483661" r:id="rId1"/>
+    <p:sldLayoutId id="2147483662" r:id="rId2"/>
+    <p:sldLayoutId id="2147483663" r:id="rId3"/>
+    <p:sldLayoutId id="2147483664" r:id="rId4"/>
+    <p:sldLayoutId id="2147483665" r:id="rId5"/>
+    <p:sldLayoutId id="2147483666" r:id="rId6"/>
+    <p:sldLayoutId id="2147483667" r:id="rId7"/>
+    <p:sldLayoutId id="2147483668" r:id="rId8"/>
+    <p:sldLayoutId id="2147483669" r:id="rId9"/>
+    <p:sldLayoutId id="2147483670" r:id="rId10"/>
+    <p:sldLayoutId id="2147483671" r:id="rId11"/>
   </p:sldLayoutIdLst>
   <p:txStyles>
     <p:titleStyle>
-      <a:lvl1pPr algn="l" defTabSz="914400" rtl="0" eaLnBrk="1" latinLnBrk="0" hangingPunct="1">
+      <a:lvl1pPr algn="l" defTabSz="4389120" rtl="0" eaLnBrk="1" latinLnBrk="0" hangingPunct="1">
         <a:lnSpc>
           <a:spcPct val="90000"/>
         </a:lnSpc>
@@ -2679,7 +2681,7 @@
           <a:spcPct val="0"/>
         </a:spcBef>
         <a:buNone/>
-        <a:defRPr sz="4400" kern="1200">
+        <a:defRPr sz="21120" kern="1200">
           <a:solidFill>
             <a:schemeClr val="tx1"/>
           </a:solidFill>
@@ -2690,16 +2692,16 @@
       </a:lvl1pPr>
     </p:titleStyle>
     <p:bodyStyle>
-      <a:lvl1pPr marL="228600" indent="-228600" algn="l" defTabSz="914400" rtl="0" eaLnBrk="1" latinLnBrk="0" hangingPunct="1">
+      <a:lvl1pPr marL="1097280" indent="-1097280" algn="l" defTabSz="4389120" rtl="0" eaLnBrk="1" latinLnBrk="0" hangingPunct="1">
         <a:lnSpc>
           <a:spcPct val="90000"/>
         </a:lnSpc>
         <a:spcBef>
-          <a:spcPts val="1000"/>
+          <a:spcPts val="4800"/>
         </a:spcBef>
         <a:buFont typeface="Arial" panose="020B0604020202020204" pitchFamily="34" charset="0"/>
         <a:buChar char="•"/>
-        <a:defRPr sz="2800" kern="1200">
+        <a:defRPr sz="13440" kern="1200">
           <a:solidFill>
             <a:schemeClr val="tx1"/>
           </a:solidFill>
@@ -2708,16 +2710,16 @@
           <a:cs typeface="+mn-cs"/>
         </a:defRPr>
       </a:lvl1pPr>
-      <a:lvl2pPr marL="685800" indent="-228600" algn="l" defTabSz="914400" rtl="0" eaLnBrk="1" latinLnBrk="0" hangingPunct="1">
+      <a:lvl2pPr marL="3291840" indent="-1097280" algn="l" defTabSz="4389120" rtl="0" eaLnBrk="1" latinLnBrk="0" hangingPunct="1">
         <a:lnSpc>
           <a:spcPct val="90000"/>
         </a:lnSpc>
         <a:spcBef>
-          <a:spcPts val="500"/>
+          <a:spcPts val="2400"/>
         </a:spcBef>
         <a:buFont typeface="Arial" panose="020B0604020202020204" pitchFamily="34" charset="0"/>
         <a:buChar char="•"/>
-        <a:defRPr sz="2400" kern="1200">
+        <a:defRPr sz="11520" kern="1200">
           <a:solidFill>
             <a:schemeClr val="tx1"/>
           </a:solidFill>
@@ -2726,16 +2728,16 @@
           <a:cs typeface="+mn-cs"/>
         </a:defRPr>
       </a:lvl2pPr>
-      <a:lvl3pPr marL="1143000" indent="-228600" algn="l" defTabSz="914400" rtl="0" eaLnBrk="1" latinLnBrk="0" hangingPunct="1">
+      <a:lvl3pPr marL="5486400" indent="-1097280" algn="l" defTabSz="4389120" rtl="0" eaLnBrk="1" latinLnBrk="0" hangingPunct="1">
         <a:lnSpc>
           <a:spcPct val="90000"/>
         </a:lnSpc>
         <a:spcBef>
-          <a:spcPts val="500"/>
+          <a:spcPts val="2400"/>
         </a:spcBef>
         <a:buFont typeface="Arial" panose="020B0604020202020204" pitchFamily="34" charset="0"/>
         <a:buChar char="•"/>
-        <a:defRPr sz="2000" kern="1200">
+        <a:defRPr sz="9600" kern="1200">
           <a:solidFill>
             <a:schemeClr val="tx1"/>
           </a:solidFill>
@@ -2744,16 +2746,16 @@
           <a:cs typeface="+mn-cs"/>
         </a:defRPr>
       </a:lvl3pPr>
-      <a:lvl4pPr marL="1600200" indent="-228600" algn="l" defTabSz="914400" rtl="0" eaLnBrk="1" latinLnBrk="0" hangingPunct="1">
+      <a:lvl4pPr marL="7680960" indent="-1097280" algn="l" defTabSz="4389120" rtl="0" eaLnBrk="1" latinLnBrk="0" hangingPunct="1">
         <a:lnSpc>
           <a:spcPct val="90000"/>
         </a:lnSpc>
         <a:spcBef>
-          <a:spcPts val="500"/>
+          <a:spcPts val="2400"/>
         </a:spcBef>
         <a:buFont typeface="Arial" panose="020B0604020202020204" pitchFamily="34" charset="0"/>
         <a:buChar char="•"/>
-        <a:defRPr sz="1800" kern="1200">
+        <a:defRPr sz="8640" kern="1200">
           <a:solidFill>
             <a:schemeClr val="tx1"/>
           </a:solidFill>
@@ -2762,16 +2764,16 @@
           <a:cs typeface="+mn-cs"/>
         </a:defRPr>
       </a:lvl4pPr>
-      <a:lvl5pPr marL="2057400" indent="-228600" algn="l" defTabSz="914400" rtl="0" eaLnBrk="1" latinLnBrk="0" hangingPunct="1">
+      <a:lvl5pPr marL="9875520" indent="-1097280" algn="l" defTabSz="4389120" rtl="0" eaLnBrk="1" latinLnBrk="0" hangingPunct="1">
         <a:lnSpc>
           <a:spcPct val="90000"/>
         </a:lnSpc>
         <a:spcBef>
-          <a:spcPts val="500"/>
+          <a:spcPts val="2400"/>
         </a:spcBef>
         <a:buFont typeface="Arial" panose="020B0604020202020204" pitchFamily="34" charset="0"/>
         <a:buChar char="•"/>
-        <a:defRPr sz="1800" kern="1200">
+        <a:defRPr sz="8640" kern="1200">
           <a:solidFill>
             <a:schemeClr val="tx1"/>
           </a:solidFill>
@@ -2780,16 +2782,16 @@
           <a:cs typeface="+mn-cs"/>
         </a:defRPr>
       </a:lvl5pPr>
-      <a:lvl6pPr marL="2514600" indent="-228600" algn="l" defTabSz="914400" rtl="0" eaLnBrk="1" latinLnBrk="0" hangingPunct="1">
+      <a:lvl6pPr marL="12070080" indent="-1097280" algn="l" defTabSz="4389120" rtl="0" eaLnBrk="1" latinLnBrk="0" hangingPunct="1">
         <a:lnSpc>
           <a:spcPct val="90000"/>
         </a:lnSpc>
         <a:spcBef>
-          <a:spcPts val="500"/>
+          <a:spcPts val="2400"/>
         </a:spcBef>
         <a:buFont typeface="Arial" panose="020B0604020202020204" pitchFamily="34" charset="0"/>
         <a:buChar char="•"/>
-        <a:defRPr sz="1800" kern="1200">
+        <a:defRPr sz="8640" kern="1200">
           <a:solidFill>
             <a:schemeClr val="tx1"/>
           </a:solidFill>
@@ -2798,16 +2800,16 @@
           <a:cs typeface="+mn-cs"/>
         </a:defRPr>
       </a:lvl6pPr>
-      <a:lvl7pPr marL="2971800" indent="-228600" algn="l" defTabSz="914400" rtl="0" eaLnBrk="1" latinLnBrk="0" hangingPunct="1">
+      <a:lvl7pPr marL="14264640" indent="-1097280" algn="l" defTabSz="4389120" rtl="0" eaLnBrk="1" latinLnBrk="0" hangingPunct="1">
         <a:lnSpc>
           <a:spcPct val="90000"/>
         </a:lnSpc>
         <a:spcBef>
-          <a:spcPts val="500"/>
+          <a:spcPts val="2400"/>
         </a:spcBef>
         <a:buFont typeface="Arial" panose="020B0604020202020204" pitchFamily="34" charset="0"/>
         <a:buChar char="•"/>
-        <a:defRPr sz="1800" kern="1200">
+        <a:defRPr sz="8640" kern="1200">
           <a:solidFill>
             <a:schemeClr val="tx1"/>
           </a:solidFill>
@@ -2816,16 +2818,16 @@
           <a:cs typeface="+mn-cs"/>
         </a:defRPr>
       </a:lvl7pPr>
-      <a:lvl8pPr marL="3429000" indent="-228600" algn="l" defTabSz="914400" rtl="0" eaLnBrk="1" latinLnBrk="0" hangingPunct="1">
+      <a:lvl8pPr marL="16459200" indent="-1097280" algn="l" defTabSz="4389120" rtl="0" eaLnBrk="1" latinLnBrk="0" hangingPunct="1">
         <a:lnSpc>
           <a:spcPct val="90000"/>
         </a:lnSpc>
         <a:spcBef>
-          <a:spcPts val="500"/>
+          <a:spcPts val="2400"/>
         </a:spcBef>
         <a:buFont typeface="Arial" panose="020B0604020202020204" pitchFamily="34" charset="0"/>
         <a:buChar char="•"/>
-        <a:defRPr sz="1800" kern="1200">
+        <a:defRPr sz="8640" kern="1200">
           <a:solidFill>
             <a:schemeClr val="tx1"/>
           </a:solidFill>
@@ -2834,16 +2836,16 @@
           <a:cs typeface="+mn-cs"/>
         </a:defRPr>
       </a:lvl8pPr>
-      <a:lvl9pPr marL="3886200" indent="-228600" algn="l" defTabSz="914400" rtl="0" eaLnBrk="1" latinLnBrk="0" hangingPunct="1">
+      <a:lvl9pPr marL="18653760" indent="-1097280" algn="l" defTabSz="4389120" rtl="0" eaLnBrk="1" latinLnBrk="0" hangingPunct="1">
         <a:lnSpc>
           <a:spcPct val="90000"/>
         </a:lnSpc>
         <a:spcBef>
-          <a:spcPts val="500"/>
+          <a:spcPts val="2400"/>
         </a:spcBef>
         <a:buFont typeface="Arial" panose="020B0604020202020204" pitchFamily="34" charset="0"/>
         <a:buChar char="•"/>
-        <a:defRPr sz="1800" kern="1200">
+        <a:defRPr sz="8640" kern="1200">
           <a:solidFill>
             <a:schemeClr val="tx1"/>
           </a:solidFill>
@@ -2857,8 +2859,8 @@
       <a:defPPr>
         <a:defRPr lang="en-US"/>
       </a:defPPr>
-      <a:lvl1pPr marL="0" algn="l" defTabSz="914400" rtl="0" eaLnBrk="1" latinLnBrk="0" hangingPunct="1">
-        <a:defRPr sz="1800" kern="1200">
+      <a:lvl1pPr marL="0" algn="l" defTabSz="4389120" rtl="0" eaLnBrk="1" latinLnBrk="0" hangingPunct="1">
+        <a:defRPr sz="8640" kern="1200">
           <a:solidFill>
             <a:schemeClr val="tx1"/>
           </a:solidFill>
@@ -2867,8 +2869,8 @@
           <a:cs typeface="+mn-cs"/>
         </a:defRPr>
       </a:lvl1pPr>
-      <a:lvl2pPr marL="457200" algn="l" defTabSz="914400" rtl="0" eaLnBrk="1" latinLnBrk="0" hangingPunct="1">
-        <a:defRPr sz="1800" kern="1200">
+      <a:lvl2pPr marL="2194560" algn="l" defTabSz="4389120" rtl="0" eaLnBrk="1" latinLnBrk="0" hangingPunct="1">
+        <a:defRPr sz="8640" kern="1200">
           <a:solidFill>
             <a:schemeClr val="tx1"/>
           </a:solidFill>
@@ -2877,8 +2879,8 @@
           <a:cs typeface="+mn-cs"/>
         </a:defRPr>
       </a:lvl2pPr>
-      <a:lvl3pPr marL="914400" algn="l" defTabSz="914400" rtl="0" eaLnBrk="1" latinLnBrk="0" hangingPunct="1">
-        <a:defRPr sz="1800" kern="1200">
+      <a:lvl3pPr marL="4389120" algn="l" defTabSz="4389120" rtl="0" eaLnBrk="1" latinLnBrk="0" hangingPunct="1">
+        <a:defRPr sz="8640" kern="1200">
           <a:solidFill>
             <a:schemeClr val="tx1"/>
           </a:solidFill>
@@ -2887,8 +2889,8 @@
           <a:cs typeface="+mn-cs"/>
         </a:defRPr>
       </a:lvl3pPr>
-      <a:lvl4pPr marL="1371600" algn="l" defTabSz="914400" rtl="0" eaLnBrk="1" latinLnBrk="0" hangingPunct="1">
-        <a:defRPr sz="1800" kern="1200">
+      <a:lvl4pPr marL="6583680" algn="l" defTabSz="4389120" rtl="0" eaLnBrk="1" latinLnBrk="0" hangingPunct="1">
+        <a:defRPr sz="8640" kern="1200">
           <a:solidFill>
             <a:schemeClr val="tx1"/>
           </a:solidFill>
@@ -2897,8 +2899,8 @@
           <a:cs typeface="+mn-cs"/>
         </a:defRPr>
       </a:lvl4pPr>
-      <a:lvl5pPr marL="1828800" algn="l" defTabSz="914400" rtl="0" eaLnBrk="1" latinLnBrk="0" hangingPunct="1">
-        <a:defRPr sz="1800" kern="1200">
+      <a:lvl5pPr marL="8778240" algn="l" defTabSz="4389120" rtl="0" eaLnBrk="1" latinLnBrk="0" hangingPunct="1">
+        <a:defRPr sz="8640" kern="1200">
           <a:solidFill>
             <a:schemeClr val="tx1"/>
           </a:solidFill>
@@ -2907,8 +2909,8 @@
           <a:cs typeface="+mn-cs"/>
         </a:defRPr>
       </a:lvl5pPr>
-      <a:lvl6pPr marL="2286000" algn="l" defTabSz="914400" rtl="0" eaLnBrk="1" latinLnBrk="0" hangingPunct="1">
-        <a:defRPr sz="1800" kern="1200">
+      <a:lvl6pPr marL="10972800" algn="l" defTabSz="4389120" rtl="0" eaLnBrk="1" latinLnBrk="0" hangingPunct="1">
+        <a:defRPr sz="8640" kern="1200">
           <a:solidFill>
             <a:schemeClr val="tx1"/>
           </a:solidFill>
@@ -2917,8 +2919,8 @@
           <a:cs typeface="+mn-cs"/>
         </a:defRPr>
       </a:lvl6pPr>
-      <a:lvl7pPr marL="2743200" algn="l" defTabSz="914400" rtl="0" eaLnBrk="1" latinLnBrk="0" hangingPunct="1">
-        <a:defRPr sz="1800" kern="1200">
+      <a:lvl7pPr marL="13167360" algn="l" defTabSz="4389120" rtl="0" eaLnBrk="1" latinLnBrk="0" hangingPunct="1">
+        <a:defRPr sz="8640" kern="1200">
           <a:solidFill>
             <a:schemeClr val="tx1"/>
           </a:solidFill>
@@ -2927,8 +2929,8 @@
           <a:cs typeface="+mn-cs"/>
         </a:defRPr>
       </a:lvl7pPr>
-      <a:lvl8pPr marL="3200400" algn="l" defTabSz="914400" rtl="0" eaLnBrk="1" latinLnBrk="0" hangingPunct="1">
-        <a:defRPr sz="1800" kern="1200">
+      <a:lvl8pPr marL="15361920" algn="l" defTabSz="4389120" rtl="0" eaLnBrk="1" latinLnBrk="0" hangingPunct="1">
+        <a:defRPr sz="8640" kern="1200">
           <a:solidFill>
             <a:schemeClr val="tx1"/>
           </a:solidFill>
@@ -2937,8 +2939,8 @@
           <a:cs typeface="+mn-cs"/>
         </a:defRPr>
       </a:lvl8pPr>
-      <a:lvl9pPr marL="3657600" algn="l" defTabSz="914400" rtl="0" eaLnBrk="1" latinLnBrk="0" hangingPunct="1">
-        <a:defRPr sz="1800" kern="1200">
+      <a:lvl9pPr marL="17556480" algn="l" defTabSz="4389120" rtl="0" eaLnBrk="1" latinLnBrk="0" hangingPunct="1">
+        <a:defRPr sz="8640" kern="1200">
           <a:solidFill>
             <a:schemeClr val="tx1"/>
           </a:solidFill>
@@ -3003,8 +3005,8 @@
         </p:blipFill>
         <p:spPr>
           <a:xfrm>
-            <a:off x="136773" y="108140"/>
-            <a:ext cx="2162175" cy="776324"/>
+            <a:off x="492383" y="501300"/>
+            <a:ext cx="7783830" cy="2794766"/>
           </a:xfrm>
           <a:prstGeom prst="rect">
             <a:avLst/>
@@ -3051,8 +3053,8 @@
         </p:blipFill>
         <p:spPr bwMode="auto">
           <a:xfrm>
-            <a:off x="2554910" y="3532"/>
-            <a:ext cx="1018284" cy="1018284"/>
+            <a:off x="8838499" y="65772"/>
+            <a:ext cx="3665822" cy="3665822"/>
           </a:xfrm>
           <a:prstGeom prst="rect">
             <a:avLst/>
@@ -3077,8 +3079,8 @@
         </p:nvSpPr>
         <p:spPr>
           <a:xfrm>
-            <a:off x="3662056" y="-52951"/>
-            <a:ext cx="4658550" cy="1569660"/>
+            <a:off x="13629535" y="-806676"/>
+            <a:ext cx="16770780" cy="5410712"/>
           </a:xfrm>
           <a:prstGeom prst="rect">
             <a:avLst/>
@@ -3093,14 +3095,11 @@
           <a:p>
             <a:pPr algn="ctr"/>
             <a:r>
-              <a:rPr lang="en-US" sz="9600" dirty="0" smtClean="0">
+              <a:rPr lang="en-US" sz="34560" dirty="0">
                 <a:latin typeface="+mj-lt"/>
               </a:rPr>
               <a:t>SAFEXEC</a:t>
             </a:r>
-            <a:endParaRPr lang="en-US" sz="9600" dirty="0" smtClean="0">
-              <a:latin typeface="+mj-lt"/>
-            </a:endParaRPr>
           </a:p>
         </p:txBody>
       </p:sp>
@@ -3127,8 +3126,8 @@
         </p:blipFill>
         <p:spPr bwMode="auto">
           <a:xfrm>
-            <a:off x="3891187" y="5844560"/>
-            <a:ext cx="1141443" cy="1141443"/>
+            <a:off x="13929279" y="4604039"/>
+            <a:ext cx="4109195" cy="4109195"/>
           </a:xfrm>
           <a:prstGeom prst="rect">
             <a:avLst/>
@@ -3168,8 +3167,8 @@
         </p:blipFill>
         <p:spPr bwMode="auto">
           <a:xfrm>
-            <a:off x="4952189" y="6008944"/>
-            <a:ext cx="760879" cy="760879"/>
+            <a:off x="17748886" y="5195821"/>
+            <a:ext cx="2739164" cy="2739164"/>
           </a:xfrm>
           <a:prstGeom prst="rect">
             <a:avLst/>
@@ -3209,8 +3208,8 @@
         </p:blipFill>
         <p:spPr bwMode="auto">
           <a:xfrm>
-            <a:off x="5738410" y="6008913"/>
-            <a:ext cx="977090" cy="977091"/>
+            <a:off x="20579280" y="5195709"/>
+            <a:ext cx="3517524" cy="3517528"/>
           </a:xfrm>
           <a:prstGeom prst="rect">
             <a:avLst/>
@@ -3249,8 +3248,8 @@
         </p:blipFill>
         <p:spPr>
           <a:xfrm>
-            <a:off x="136773" y="5291376"/>
-            <a:ext cx="3805578" cy="1458425"/>
+            <a:off x="492383" y="27116582"/>
+            <a:ext cx="13700081" cy="5250330"/>
           </a:xfrm>
           <a:prstGeom prst="rect">
             <a:avLst/>
@@ -3304,8 +3303,8 @@
         </p:blipFill>
         <p:spPr>
           <a:xfrm>
-            <a:off x="6564354" y="6034841"/>
-            <a:ext cx="904379" cy="760882"/>
+            <a:off x="23552680" y="5289049"/>
+            <a:ext cx="3255764" cy="2739175"/>
           </a:xfrm>
           <a:prstGeom prst="rect">
             <a:avLst/>
@@ -3324,8 +3323,8 @@
         </p:nvSpPr>
         <p:spPr>
           <a:xfrm>
-            <a:off x="136773" y="1020793"/>
-            <a:ext cx="3805578" cy="4154984"/>
+            <a:off x="492383" y="4607308"/>
+            <a:ext cx="13700081" cy="22695444"/>
           </a:xfrm>
           <a:prstGeom prst="rect">
             <a:avLst/>
@@ -3340,45 +3339,53 @@
           <a:p>
             <a:pPr algn="ctr"/>
             <a:r>
-              <a:rPr lang="en-US" sz="3600" dirty="0" smtClean="0"/>
+              <a:rPr lang="en-US" sz="12960" dirty="0"/>
               <a:t>What is Code Signing?</a:t>
             </a:r>
           </a:p>
           <a:p>
             <a:pPr algn="ctr"/>
             <a:r>
-              <a:rPr lang="en-US" sz="2400" dirty="0"/>
+              <a:rPr lang="en-US" sz="8640" dirty="0"/>
               <a:t>Code signing is the process of digitally signing </a:t>
             </a:r>
             <a:r>
-              <a:rPr lang="en-US" sz="2400" dirty="0" smtClean="0"/>
-              <a:t>a binary executable in order to </a:t>
-            </a:r>
-            <a:r>
-              <a:rPr lang="en-US" sz="2400" dirty="0"/>
-              <a:t>confirm </a:t>
-            </a:r>
-            <a:r>
-              <a:rPr lang="en-US" sz="2400" dirty="0" smtClean="0"/>
-              <a:t>that </a:t>
-            </a:r>
-            <a:r>
-              <a:rPr lang="en-US" sz="2400" dirty="0"/>
-              <a:t>the code has not been </a:t>
-            </a:r>
-            <a:r>
-              <a:rPr lang="en-US" sz="2400" dirty="0" smtClean="0"/>
+              <a:rPr lang="en-US" sz="8640" dirty="0"/>
+              <a:t>a binary </a:t>
+            </a:r>
+            <a:r>
+              <a:rPr lang="en-US" sz="8640" dirty="0" smtClean="0"/>
+              <a:t>executable file. Similar to signing a letter, it is a method of ensuring that the </a:t>
+            </a:r>
+            <a:r>
+              <a:rPr lang="en-US" sz="8640" dirty="0"/>
+              <a:t>code has not been </a:t>
+            </a:r>
+            <a:r>
+              <a:rPr lang="en-US" sz="8640" dirty="0"/>
               <a:t>tampered with since </a:t>
             </a:r>
             <a:r>
-              <a:rPr lang="en-US" sz="2400" dirty="0"/>
+              <a:rPr lang="en-US" sz="8640" dirty="0"/>
               <a:t>it was </a:t>
             </a:r>
             <a:r>
-              <a:rPr lang="en-US" sz="2400" dirty="0" smtClean="0"/>
-              <a:t>signed. Safexec is a code signing application for executable files on Linux.</a:t>
-            </a:r>
-            <a:endParaRPr lang="en-US" sz="2400" dirty="0"/>
+              <a:rPr lang="en-US" sz="8640" dirty="0"/>
+              <a:t>signed. Safexec is a code signing application for executable </a:t>
+            </a:r>
+            <a:r>
+              <a:rPr lang="en-US" sz="8640" dirty="0" smtClean="0"/>
+              <a:t>files (ELF format) </a:t>
+            </a:r>
+            <a:r>
+              <a:rPr lang="en-US" sz="8640" dirty="0"/>
+              <a:t>on Linux</a:t>
+            </a:r>
+            <a:r>
+              <a:rPr lang="en-US" sz="8640" dirty="0" smtClean="0"/>
+              <a:t>. Code signing is useful for anyone who wants to send executable binaries over an insecure internet connection.</a:t>
+            </a:r>
+            <a:endParaRPr lang="en-US" sz="8640" dirty="0"/>
           </a:p>
         </p:txBody>
       </p:sp>
@@ -3390,8 +3397,8 @@
         </p:nvSpPr>
         <p:spPr>
           <a:xfrm>
-            <a:off x="8288163" y="847478"/>
-            <a:ext cx="3805578" cy="4154984"/>
+            <a:off x="29837386" y="4607308"/>
+            <a:ext cx="13700081" cy="21365849"/>
           </a:xfrm>
           <a:prstGeom prst="rect">
             <a:avLst/>
@@ -3406,18 +3413,125 @@
           <a:p>
             <a:pPr algn="ctr"/>
             <a:r>
-              <a:rPr lang="en-US" sz="3600" dirty="0" smtClean="0"/>
+              <a:rPr lang="en-US" sz="12960" dirty="0"/>
               <a:t>How Does Safexec Work?</a:t>
             </a:r>
-            <a:endParaRPr lang="en-US" sz="3600" dirty="0"/>
-          </a:p>
-          <a:p>
-            <a:pPr algn="ctr"/>
-            <a:r>
-              <a:rPr lang="en-US" sz="2400" dirty="0" smtClean="0"/>
-              <a:t>The programmer uses Safexec to sign an ELF file into an ELFS file. The ELFS is sent to the user. Safexec is run on the ELFS. Safexec informs the user if the ELFS is safe to execute. An ELF is then produced for the user.</a:t>
-            </a:r>
-            <a:endParaRPr lang="en-US" sz="2400" dirty="0"/>
+            <a:endParaRPr lang="en-US" sz="12960" dirty="0"/>
+          </a:p>
+          <a:p>
+            <a:pPr marL="1371600" indent="-1371600">
+              <a:buFont typeface="+mj-lt"/>
+              <a:buAutoNum type="arabicPeriod"/>
+            </a:pPr>
+            <a:r>
+              <a:rPr lang="en-US" sz="8640" dirty="0" smtClean="0"/>
+              <a:t>The </a:t>
+            </a:r>
+            <a:r>
+              <a:rPr lang="en-US" sz="8640" dirty="0"/>
+              <a:t>programmer uses Safexec to sign an ELF file into an ELFS file</a:t>
+            </a:r>
+            <a:r>
+              <a:rPr lang="en-US" sz="8640" dirty="0" smtClean="0"/>
+              <a:t>.</a:t>
+            </a:r>
+          </a:p>
+          <a:p>
+            <a:pPr marL="1371600" indent="-1371600">
+              <a:buFont typeface="+mj-lt"/>
+              <a:buAutoNum type="arabicPeriod"/>
+            </a:pPr>
+            <a:r>
+              <a:rPr lang="en-US" sz="8640" dirty="0" smtClean="0"/>
+              <a:t> </a:t>
+            </a:r>
+            <a:r>
+              <a:rPr lang="en-US" sz="8640" dirty="0"/>
+              <a:t>The ELFS </a:t>
+            </a:r>
+            <a:r>
+              <a:rPr lang="en-US" sz="8640" dirty="0" smtClean="0"/>
+              <a:t>file is </a:t>
+            </a:r>
+            <a:r>
+              <a:rPr lang="en-US" sz="8640" dirty="0"/>
+              <a:t>sent to the </a:t>
+            </a:r>
+            <a:r>
+              <a:rPr lang="en-US" sz="8640" dirty="0" smtClean="0"/>
+              <a:t>user over the internet.</a:t>
+            </a:r>
+          </a:p>
+          <a:p>
+            <a:pPr marL="1371600" indent="-1371600">
+              <a:buFont typeface="+mj-lt"/>
+              <a:buAutoNum type="arabicPeriod"/>
+            </a:pPr>
+            <a:r>
+              <a:rPr lang="en-US" sz="8640" dirty="0" smtClean="0"/>
+              <a:t>The user receives the ELFS file and runs Safexec on it.</a:t>
+            </a:r>
+          </a:p>
+          <a:p>
+            <a:pPr marL="1371600" indent="-1371600">
+              <a:buFont typeface="+mj-lt"/>
+              <a:buAutoNum type="arabicPeriod"/>
+            </a:pPr>
+            <a:r>
+              <a:rPr lang="en-US" sz="8640" dirty="0" smtClean="0"/>
+              <a:t>Safexec </a:t>
+            </a:r>
+            <a:r>
+              <a:rPr lang="en-US" sz="8640" dirty="0"/>
+              <a:t>informs the user </a:t>
+            </a:r>
+            <a:r>
+              <a:rPr lang="en-US" sz="8640" dirty="0" smtClean="0"/>
+              <a:t>whether or not the </a:t>
+            </a:r>
+            <a:r>
+              <a:rPr lang="en-US" sz="8640" dirty="0"/>
+              <a:t>ELFS </a:t>
+            </a:r>
+            <a:r>
+              <a:rPr lang="en-US" sz="8640" dirty="0" smtClean="0"/>
+              <a:t>file is </a:t>
+            </a:r>
+            <a:r>
+              <a:rPr lang="en-US" sz="8640" dirty="0"/>
+              <a:t>safe to </a:t>
+            </a:r>
+            <a:r>
+              <a:rPr lang="en-US" sz="8640" dirty="0" smtClean="0"/>
+              <a:t>execute.</a:t>
+            </a:r>
+          </a:p>
+          <a:p>
+            <a:pPr marL="1371600" indent="-1371600">
+              <a:buFont typeface="+mj-lt"/>
+              <a:buAutoNum type="arabicPeriod"/>
+            </a:pPr>
+            <a:r>
+              <a:rPr lang="en-US" sz="8640" dirty="0" smtClean="0"/>
+              <a:t>An </a:t>
+            </a:r>
+            <a:r>
+              <a:rPr lang="en-US" sz="8640" dirty="0"/>
+              <a:t>ELF </a:t>
+            </a:r>
+            <a:r>
+              <a:rPr lang="en-US" sz="8640" dirty="0" smtClean="0"/>
+              <a:t>file is </a:t>
+            </a:r>
+            <a:r>
+              <a:rPr lang="en-US" sz="8640" dirty="0"/>
+              <a:t>then produced for the </a:t>
+            </a:r>
+            <a:r>
+              <a:rPr lang="en-US" sz="8640" dirty="0" smtClean="0"/>
+              <a:t>user to run if they choose.</a:t>
+            </a:r>
+            <a:endParaRPr lang="en-US" sz="8640" dirty="0"/>
           </a:p>
         </p:txBody>
       </p:sp>
@@ -3443,8 +3557,8 @@
         </p:blipFill>
         <p:spPr>
           <a:xfrm>
-            <a:off x="8288163" y="5002462"/>
-            <a:ext cx="3805578" cy="1747339"/>
+            <a:off x="29837385" y="26157198"/>
+            <a:ext cx="13700081" cy="6290420"/>
           </a:xfrm>
           <a:prstGeom prst="rect">
             <a:avLst/>
@@ -3459,8 +3573,8 @@
         </p:nvSpPr>
         <p:spPr>
           <a:xfrm>
-            <a:off x="8759698" y="108140"/>
-            <a:ext cx="3334043" cy="707886"/>
+            <a:off x="31534913" y="744521"/>
+            <a:ext cx="12002555" cy="2308324"/>
           </a:xfrm>
           <a:prstGeom prst="rect">
             <a:avLst/>
@@ -3475,17 +3589,17 @@
           <a:p>
             <a:pPr algn="r"/>
             <a:r>
-              <a:rPr lang="en-US" sz="2000" dirty="0"/>
+              <a:rPr lang="en-US" sz="7200" dirty="0"/>
               <a:t>John Hardy</a:t>
             </a:r>
           </a:p>
           <a:p>
             <a:pPr algn="r"/>
             <a:r>
-              <a:rPr lang="en-US" sz="2000" dirty="0" smtClean="0"/>
+              <a:rPr lang="en-US" sz="7200" dirty="0"/>
               <a:t>CMSI 402</a:t>
             </a:r>
-            <a:endParaRPr lang="en-US" sz="2000" dirty="0"/>
+            <a:endParaRPr lang="en-US" sz="7200" dirty="0"/>
           </a:p>
         </p:txBody>
       </p:sp>
@@ -3512,8 +3626,8 @@
         </p:blipFill>
         <p:spPr bwMode="auto">
           <a:xfrm>
-            <a:off x="7443060" y="6051055"/>
-            <a:ext cx="728454" cy="728454"/>
+            <a:off x="26716020" y="5347419"/>
+            <a:ext cx="2622434" cy="2622434"/>
           </a:xfrm>
           <a:prstGeom prst="rect">
             <a:avLst/>
@@ -3538,8 +3652,8 @@
         </p:nvSpPr>
         <p:spPr>
           <a:xfrm>
-            <a:off x="4212468" y="1392028"/>
-            <a:ext cx="3805578" cy="4708981"/>
+            <a:off x="15164884" y="9216860"/>
+            <a:ext cx="13700081" cy="22030646"/>
           </a:xfrm>
           <a:prstGeom prst="rect">
             <a:avLst/>
@@ -3554,25 +3668,57 @@
           <a:p>
             <a:pPr algn="ctr"/>
             <a:r>
-              <a:rPr lang="en-US" sz="3600" dirty="0" smtClean="0"/>
+              <a:rPr lang="en-US" sz="12960" dirty="0"/>
               <a:t>Resources Utilized</a:t>
             </a:r>
           </a:p>
           <a:p>
             <a:pPr algn="ctr"/>
             <a:r>
-              <a:rPr lang="en-US" sz="2400" dirty="0" smtClean="0"/>
+              <a:rPr lang="en-US" sz="8640" dirty="0"/>
               <a:t>All of the source code for Safexec was written in Python. The </a:t>
             </a:r>
             <a:r>
-              <a:rPr lang="en-US" sz="2400" i="1" dirty="0" smtClean="0"/>
+              <a:rPr lang="en-US" sz="8640" i="1" dirty="0"/>
               <a:t>Hashlib</a:t>
             </a:r>
             <a:r>
-              <a:rPr lang="en-US" sz="2400" dirty="0" smtClean="0"/>
-              <a:t> library was used for the SHA 512 hashing. HxD was used to manipulate executables in hexadecimal format. GitHub was used for version control. Ubuntu was used for generating ELF files for modification.</a:t>
-            </a:r>
-            <a:endParaRPr lang="en-US" sz="2400" dirty="0"/>
+              <a:rPr lang="en-US" sz="8640" dirty="0"/>
+              <a:t> library was used </a:t>
+            </a:r>
+            <a:r>
+              <a:rPr lang="en-US" sz="8640" dirty="0" smtClean="0"/>
+              <a:t>to access the </a:t>
+            </a:r>
+            <a:r>
+              <a:rPr lang="en-US" sz="8640" dirty="0"/>
+              <a:t>SHA 512 </a:t>
+            </a:r>
+            <a:r>
+              <a:rPr lang="en-US" sz="8640" dirty="0" smtClean="0"/>
+              <a:t>hashing algorithm. The Secure Hashing Algorithm version 3, 512 bit hash version is used to hash the ELF files. </a:t>
+            </a:r>
+            <a:r>
+              <a:rPr lang="en-US" sz="8640" dirty="0"/>
+              <a:t>HxD was used to manipulate executables in hexadecimal </a:t>
+            </a:r>
+            <a:r>
+              <a:rPr lang="en-US" sz="8640" dirty="0" smtClean="0"/>
+              <a:t>format for testing purposes. </a:t>
+            </a:r>
+            <a:r>
+              <a:rPr lang="en-US" sz="8640" dirty="0"/>
+              <a:t>GitHub was used for version control. </a:t>
+            </a:r>
+            <a:r>
+              <a:rPr lang="en-US" sz="8640" dirty="0"/>
+              <a:t>Ubuntu was used for generating ELF files for </a:t>
+            </a:r>
+            <a:r>
+              <a:rPr lang="en-US" sz="8640" dirty="0" smtClean="0"/>
+              <a:t>modification and testing.</a:t>
+            </a:r>
+            <a:endParaRPr lang="en-US" sz="8640" dirty="0"/>
           </a:p>
         </p:txBody>
       </p:sp>
@@ -3592,7 +3738,7 @@
 <file path=ppt/theme/theme1.xml><?xml version="1.0" encoding="utf-8"?>
 <a:theme xmlns:a="http://schemas.openxmlformats.org/drawingml/2006/main" name="Office Theme">
   <a:themeElements>
-    <a:clrScheme name="Office">
+    <a:clrScheme name="Office Theme">
       <a:dk1>
         <a:sysClr val="windowText" lastClr="000000"/>
       </a:dk1>
@@ -3630,7 +3776,7 @@
         <a:srgbClr val="954F72"/>
       </a:folHlink>
     </a:clrScheme>
-    <a:fontScheme name="Office">
+    <a:fontScheme name="Office Theme">
       <a:majorFont>
         <a:latin typeface="Calibri Light" panose="020F0302020204030204"/>
         <a:ea typeface=""/>
@@ -3702,7 +3848,7 @@
         <a:font script="Geor" typeface="Sylfaen"/>
       </a:minorFont>
     </a:fontScheme>
-    <a:fmtScheme name="Office">
+    <a:fmtScheme name="Office Theme">
       <a:fillStyleLst>
         <a:solidFill>
           <a:schemeClr val="phClr"/>

</xml_diff>